<commit_message>
pptx: update slide modified color and pages number
</commit_message>
<xml_diff>
--- a/Docs/DDoSDefence.pptx
+++ b/Docs/DDoSDefence.pptx
@@ -16,10 +16,10 @@
     <p:sldId id="258" r:id="rId7"/>
     <p:sldId id="263" r:id="rId8"/>
     <p:sldId id="265" r:id="rId9"/>
-    <p:sldId id="267" r:id="rId10"/>
-    <p:sldId id="268" r:id="rId11"/>
-    <p:sldId id="269" r:id="rId12"/>
-    <p:sldId id="270" r:id="rId13"/>
+    <p:sldId id="281" r:id="rId10"/>
+    <p:sldId id="282" r:id="rId11"/>
+    <p:sldId id="283" r:id="rId12"/>
+    <p:sldId id="284" r:id="rId13"/>
     <p:sldId id="257" r:id="rId14"/>
     <p:sldId id="277" r:id="rId15"/>
     <p:sldId id="273" r:id="rId16"/>
@@ -126,6 +126,9 @@
   <p:extLst>
     <p:ext uri="{EFAFB233-063F-42B5-8137-9DF3F51BA10A}">
       <p15:sldGuideLst xmlns:p15="http://schemas.microsoft.com/office/powerpoint/2012/main"/>
+    </p:ext>
+    <p:ext uri="{2D200454-40CA-4A62-9FC3-DE9A4176ACB9}">
+      <p15:notesGuideLst xmlns:p15="http://schemas.microsoft.com/office/powerpoint/2012/main"/>
     </p:ext>
   </p:extLst>
 </p:presentation>
@@ -641,6 +644,30 @@
               <a:rPr lang="it-IT" dirty="0"/>
               <a:t> e switch</a:t>
             </a:r>
+            <a:br>
+              <a:rPr lang="it-IT" dirty="0"/>
+            </a:br>
+            <a:r>
+              <a:rPr lang="it-IT" dirty="0"/>
+              <a:t>https://www.opennetworking.org/wp-content/uploads/2014/10/openflow-spec-v1.3.3.pdf</a:t>
+            </a:r>
+            <a:br>
+              <a:rPr lang="it-IT" dirty="0"/>
+            </a:br>
+            <a:r>
+              <a:rPr lang="it-IT" dirty="0" err="1"/>
+              <a:t>chapter</a:t>
+            </a:r>
+            <a:r>
+              <a:rPr lang="it-IT" dirty="0"/>
+              <a:t> 5.1</a:t>
+            </a:r>
+          </a:p>
+          <a:p>
+            <a:pPr marL="228600" indent="-228600">
+              <a:buAutoNum type="arabicPeriod"/>
+            </a:pPr>
+            <a:endParaRPr lang="it-IT" dirty="0"/>
           </a:p>
           <a:p>
             <a:pPr marL="228600" indent="-228600">
@@ -688,7 +715,7 @@
     </p:spTree>
     <p:extLst>
       <p:ext uri="{BB962C8B-B14F-4D97-AF65-F5344CB8AC3E}">
-        <p14:creationId xmlns:p14="http://schemas.microsoft.com/office/powerpoint/2010/main" val="3244972490"/>
+        <p14:creationId xmlns:p14="http://schemas.microsoft.com/office/powerpoint/2010/main" val="2402322358"/>
       </p:ext>
     </p:extLst>
   </p:cSld>
@@ -1783,6 +1810,30 @@
               <a:rPr lang="it-IT" dirty="0"/>
               <a:t> e switch</a:t>
             </a:r>
+            <a:br>
+              <a:rPr lang="it-IT" dirty="0"/>
+            </a:br>
+            <a:r>
+              <a:rPr lang="it-IT" dirty="0"/>
+              <a:t>https://www.opennetworking.org/wp-content/uploads/2014/10/openflow-spec-v1.3.3.pdf</a:t>
+            </a:r>
+            <a:br>
+              <a:rPr lang="it-IT" dirty="0"/>
+            </a:br>
+            <a:r>
+              <a:rPr lang="it-IT" dirty="0" err="1"/>
+              <a:t>chapter</a:t>
+            </a:r>
+            <a:r>
+              <a:rPr lang="it-IT" dirty="0"/>
+              <a:t> 5.1</a:t>
+            </a:r>
+          </a:p>
+          <a:p>
+            <a:pPr marL="228600" indent="-228600">
+              <a:buAutoNum type="arabicPeriod"/>
+            </a:pPr>
+            <a:endParaRPr lang="it-IT" dirty="0"/>
           </a:p>
           <a:p>
             <a:pPr marL="228600" indent="-228600">
@@ -1830,7 +1881,7 @@
     </p:spTree>
     <p:extLst>
       <p:ext uri="{BB962C8B-B14F-4D97-AF65-F5344CB8AC3E}">
-        <p14:creationId xmlns:p14="http://schemas.microsoft.com/office/powerpoint/2010/main" val="1747886683"/>
+        <p14:creationId xmlns:p14="http://schemas.microsoft.com/office/powerpoint/2010/main" val="2565949135"/>
       </p:ext>
     </p:extLst>
   </p:cSld>
@@ -1916,6 +1967,30 @@
               <a:rPr lang="it-IT" dirty="0"/>
               <a:t> e switch</a:t>
             </a:r>
+            <a:br>
+              <a:rPr lang="it-IT" dirty="0"/>
+            </a:br>
+            <a:r>
+              <a:rPr lang="it-IT" dirty="0"/>
+              <a:t>https://www.opennetworking.org/wp-content/uploads/2014/10/openflow-spec-v1.3.3.pdf</a:t>
+            </a:r>
+            <a:br>
+              <a:rPr lang="it-IT" dirty="0"/>
+            </a:br>
+            <a:r>
+              <a:rPr lang="it-IT" dirty="0" err="1"/>
+              <a:t>chapter</a:t>
+            </a:r>
+            <a:r>
+              <a:rPr lang="it-IT" dirty="0"/>
+              <a:t> 5.1</a:t>
+            </a:r>
+          </a:p>
+          <a:p>
+            <a:pPr marL="228600" indent="-228600">
+              <a:buAutoNum type="arabicPeriod"/>
+            </a:pPr>
+            <a:endParaRPr lang="it-IT" dirty="0"/>
           </a:p>
           <a:p>
             <a:pPr marL="228600" indent="-228600">
@@ -1963,7 +2038,7 @@
     </p:spTree>
     <p:extLst>
       <p:ext uri="{BB962C8B-B14F-4D97-AF65-F5344CB8AC3E}">
-        <p14:creationId xmlns:p14="http://schemas.microsoft.com/office/powerpoint/2010/main" val="1023302255"/>
+        <p14:creationId xmlns:p14="http://schemas.microsoft.com/office/powerpoint/2010/main" val="2059098587"/>
       </p:ext>
     </p:extLst>
   </p:cSld>
@@ -2049,6 +2124,30 @@
               <a:rPr lang="it-IT" dirty="0"/>
               <a:t> e switch</a:t>
             </a:r>
+            <a:br>
+              <a:rPr lang="it-IT" dirty="0"/>
+            </a:br>
+            <a:r>
+              <a:rPr lang="it-IT" dirty="0"/>
+              <a:t>https://www.opennetworking.org/wp-content/uploads/2014/10/openflow-spec-v1.3.3.pdf</a:t>
+            </a:r>
+            <a:br>
+              <a:rPr lang="it-IT" dirty="0"/>
+            </a:br>
+            <a:r>
+              <a:rPr lang="it-IT" dirty="0" err="1"/>
+              <a:t>chapter</a:t>
+            </a:r>
+            <a:r>
+              <a:rPr lang="it-IT" dirty="0"/>
+              <a:t> 5.1</a:t>
+            </a:r>
+          </a:p>
+          <a:p>
+            <a:pPr marL="228600" indent="-228600">
+              <a:buAutoNum type="arabicPeriod"/>
+            </a:pPr>
+            <a:endParaRPr lang="it-IT" dirty="0"/>
           </a:p>
           <a:p>
             <a:pPr marL="228600" indent="-228600">
@@ -2096,7 +2195,7 @@
     </p:spTree>
     <p:extLst>
       <p:ext uri="{BB962C8B-B14F-4D97-AF65-F5344CB8AC3E}">
-        <p14:creationId xmlns:p14="http://schemas.microsoft.com/office/powerpoint/2010/main" val="1126364253"/>
+        <p14:creationId xmlns:p14="http://schemas.microsoft.com/office/powerpoint/2010/main" val="3998680832"/>
       </p:ext>
     </p:extLst>
   </p:cSld>
@@ -5482,7 +5581,7 @@
         </p:nvSpPr>
         <p:spPr>
           <a:xfrm>
-            <a:off x="2860963" y="5333856"/>
+            <a:off x="2820019" y="5340680"/>
             <a:ext cx="9144000" cy="1655762"/>
           </a:xfrm>
         </p:spPr>
@@ -5564,7 +5663,7 @@
         </p:blipFill>
         <p:spPr>
           <a:xfrm>
-            <a:off x="90589" y="5162966"/>
+            <a:off x="247540" y="5026486"/>
             <a:ext cx="2977657" cy="1584198"/>
           </a:xfrm>
           <a:prstGeom prst="rect">
@@ -5624,7 +5723,11 @@
           <a:lstStyle/>
           <a:p>
             <a:r>
-              <a:rPr lang="en-GB" b="1" noProof="0" dirty="0"/>
+              <a:rPr lang="en-GB" b="1" noProof="0" dirty="0">
+                <a:solidFill>
+                  <a:schemeClr val="tx2"/>
+                </a:solidFill>
+              </a:rPr>
               <a:t>Implementation Issues</a:t>
             </a:r>
           </a:p>
@@ -5646,15 +5749,20 @@
             <p:ph idx="1"/>
           </p:nvPr>
         </p:nvSpPr>
-        <p:spPr/>
+        <p:spPr>
+          <a:xfrm>
+            <a:off x="838200" y="1825625"/>
+            <a:ext cx="10515600" cy="4351338"/>
+          </a:xfrm>
+        </p:spPr>
         <p:txBody>
           <a:bodyPr>
-            <a:normAutofit fontScale="92500" lnSpcReduction="20000"/>
+            <a:normAutofit fontScale="92500"/>
           </a:bodyPr>
           <a:lstStyle/>
           <a:p>
             <a:r>
-              <a:rPr lang="en-GB" sz="3000" noProof="0" dirty="0">
+              <a:rPr lang="en-GB" noProof="0" dirty="0">
                 <a:solidFill>
                   <a:schemeClr val="bg1">
                     <a:lumMod val="75000"/>
@@ -5664,7 +5772,7 @@
               <a:t>Execution order of floodlight modules </a:t>
             </a:r>
             <a:r>
-              <a:rPr lang="en-GB" sz="3000" noProof="0" dirty="0">
+              <a:rPr lang="en-GB" noProof="0" dirty="0">
                 <a:solidFill>
                   <a:schemeClr val="bg1">
                     <a:lumMod val="75000"/>
@@ -5678,22 +5786,36 @@
                   </a:extLst>
                 </a:hlinkClick>
               </a:rPr>
-              <a:t>here</a:t>
-            </a:r>
-            <a:r>
-              <a:rPr lang="en-GB" sz="3000" noProof="0" dirty="0">
+              <a:t>[</a:t>
+            </a:r>
+            <a:r>
+              <a:rPr lang="en-GB" dirty="0">
                 <a:solidFill>
                   <a:schemeClr val="bg1">
                     <a:lumMod val="75000"/>
                   </a:schemeClr>
                 </a:solidFill>
+                <a:hlinkClick r:id="rId3">
+                  <a:extLst>
+                    <a:ext uri="{A12FA001-AC4F-418D-AE19-62706E023703}">
+                      <ahyp:hlinkClr xmlns:ahyp="http://schemas.microsoft.com/office/drawing/2018/hyperlinkcolor" val="tx"/>
+                    </a:ext>
+                  </a:extLst>
+                </a:hlinkClick>
               </a:rPr>
-              <a:t>.</a:t>
-            </a:r>
-          </a:p>
-          <a:p>
-            <a:r>
-              <a:rPr lang="en-GB" sz="3000" noProof="0" dirty="0">
+              <a:t>1]</a:t>
+            </a:r>
+            <a:endParaRPr lang="en-GB" noProof="0" dirty="0">
+              <a:solidFill>
+                <a:schemeClr val="bg1">
+                  <a:lumMod val="75000"/>
+                </a:schemeClr>
+              </a:solidFill>
+            </a:endParaRPr>
+          </a:p>
+          <a:p>
+            <a:r>
+              <a:rPr lang="en-GB" noProof="0" dirty="0">
                 <a:solidFill>
                   <a:schemeClr val="bg1">
                     <a:lumMod val="75000"/>
@@ -5703,7 +5825,7 @@
               <a:t>The normal rule (</a:t>
             </a:r>
             <a:r>
-              <a:rPr lang="en-GB" sz="3000" noProof="0" dirty="0" err="1">
+              <a:rPr lang="en-GB" noProof="0" dirty="0" err="1">
                 <a:solidFill>
                   <a:schemeClr val="bg1">
                     <a:lumMod val="75000"/>
@@ -5713,50 +5835,17 @@
               <a:t>action.normal</a:t>
             </a:r>
             <a:r>
-              <a:rPr lang="en-GB" sz="3000" noProof="0" dirty="0">
+              <a:rPr lang="en-GB" noProof="0" dirty="0">
                 <a:solidFill>
                   <a:schemeClr val="bg1">
                     <a:lumMod val="75000"/>
                   </a:schemeClr>
                 </a:solidFill>
               </a:rPr>
-              <a:t>) does not work for non hybrid switches.</a:t>
-            </a:r>
-          </a:p>
-          <a:p>
-            <a:r>
-              <a:rPr lang="en-GB" sz="3500" b="1" noProof="0" dirty="0"/>
-              <a:t>Learning switch: </a:t>
-            </a:r>
-          </a:p>
-          <a:p>
-            <a:pPr lvl="1"/>
-            <a:r>
-              <a:rPr lang="en-GB" sz="2800" b="1" noProof="0" dirty="0"/>
-              <a:t>Add interface </a:t>
-            </a:r>
-            <a:r>
-              <a:rPr lang="en-GB" sz="2800" b="1" dirty="0"/>
-              <a:t>to retrieve </a:t>
-            </a:r>
-            <a:r>
-              <a:rPr lang="en-GB" sz="2800" b="1" noProof="0" dirty="0"/>
-              <a:t>MAC addresses from the learning switch controller.</a:t>
-            </a:r>
-          </a:p>
-          <a:p>
-            <a:r>
-              <a:rPr lang="en-GB" sz="2900" noProof="0" dirty="0">
-                <a:solidFill>
-                  <a:schemeClr val="bg1">
-                    <a:lumMod val="75000"/>
-                  </a:schemeClr>
-                </a:solidFill>
-              </a:rPr>
-              <a:t>Deleting rules are specified </a:t>
-            </a:r>
-            <a:r>
-              <a:rPr lang="en-GB" sz="2900" noProof="0" dirty="0">
+              <a:t>) does not work for non hybrid switches </a:t>
+            </a:r>
+            <a:r>
+              <a:rPr lang="en-GB" noProof="0" dirty="0">
                 <a:solidFill>
                   <a:schemeClr val="bg1">
                     <a:lumMod val="75000"/>
@@ -5770,80 +5859,171 @@
                   </a:extLst>
                 </a:hlinkClick>
               </a:rPr>
-              <a:t>here</a:t>
-            </a:r>
-            <a:r>
-              <a:rPr lang="en-GB" sz="2900" noProof="0" dirty="0">
+              <a:t>[2]</a:t>
+            </a:r>
+            <a:endParaRPr lang="en-GB" noProof="0" dirty="0">
+              <a:solidFill>
+                <a:schemeClr val="bg1">
+                  <a:lumMod val="75000"/>
+                </a:schemeClr>
+              </a:solidFill>
+            </a:endParaRPr>
+          </a:p>
+          <a:p>
+            <a:r>
+              <a:rPr lang="en-GB" sz="3200" b="1" noProof="0" dirty="0"/>
+              <a:t>Learning switch:</a:t>
+            </a:r>
+            <a:r>
+              <a:rPr lang="en-GB" sz="3200" b="1" noProof="0" dirty="0">
                 <a:solidFill>
                   <a:schemeClr val="bg1">
                     <a:lumMod val="75000"/>
                   </a:schemeClr>
                 </a:solidFill>
               </a:rPr>
-              <a:t>. </a:t>
+              <a:t> </a:t>
             </a:r>
           </a:p>
           <a:p>
             <a:pPr lvl="1"/>
             <a:r>
-              <a:rPr lang="en-GB" sz="2600" noProof="0" dirty="0" err="1">
+              <a:rPr lang="en-GB" sz="2800" b="1" noProof="0" dirty="0"/>
+              <a:t>Added method to </a:t>
+            </a:r>
+            <a:r>
+              <a:rPr lang="en-GB" sz="2800" b="1" i="1" noProof="0" dirty="0" err="1"/>
+              <a:t>ILearningSwitch</a:t>
+            </a:r>
+            <a:r>
+              <a:rPr lang="en-GB" sz="2800" b="1" noProof="0" dirty="0"/>
+              <a:t> </a:t>
+            </a:r>
+            <a:r>
+              <a:rPr lang="en-GB" sz="2800" b="1" dirty="0"/>
+              <a:t>to retrieve learned </a:t>
+            </a:r>
+            <a:r>
+              <a:rPr lang="en-GB" sz="2800" b="1" noProof="0" dirty="0"/>
+              <a:t>port from MAC address</a:t>
+            </a:r>
+          </a:p>
+          <a:p>
+            <a:r>
+              <a:rPr lang="en-GB" noProof="0" dirty="0">
                 <a:solidFill>
                   <a:schemeClr val="bg1">
                     <a:lumMod val="75000"/>
                   </a:schemeClr>
                 </a:solidFill>
               </a:rPr>
-              <a:t>OFFlowDelete</a:t>
-            </a:r>
-            <a:r>
-              <a:rPr lang="en-GB" sz="2600" noProof="0" dirty="0">
+              <a:t>Deleting rules types [</a:t>
+            </a:r>
+            <a:r>
+              <a:rPr lang="en-GB" noProof="0" dirty="0">
                 <a:solidFill>
                   <a:schemeClr val="bg1">
                     <a:lumMod val="75000"/>
                   </a:schemeClr>
                 </a:solidFill>
+                <a:hlinkClick r:id="rId5">
+                  <a:extLst>
+                    <a:ext uri="{A12FA001-AC4F-418D-AE19-62706E023703}">
+                      <ahyp:hlinkClr xmlns:ahyp="http://schemas.microsoft.com/office/drawing/2018/hyperlinkcolor" val="tx"/>
+                    </a:ext>
+                  </a:extLst>
+                </a:hlinkClick>
               </a:rPr>
-              <a:t> deletes rules matching at least the specified fields;</a:t>
-            </a:r>
-          </a:p>
-          <a:p>
-            <a:pPr lvl="1"/>
-            <a:r>
-              <a:rPr lang="en-GB" sz="2600" noProof="0" dirty="0" err="1">
+              <a:t>3</a:t>
+            </a:r>
+            <a:r>
+              <a:rPr lang="en-GB" noProof="0" dirty="0">
                 <a:solidFill>
                   <a:schemeClr val="bg1">
                     <a:lumMod val="75000"/>
                   </a:schemeClr>
                 </a:solidFill>
               </a:rPr>
-              <a:t>OFFlowDeleteStrict</a:t>
-            </a:r>
-            <a:r>
-              <a:rPr lang="en-GB" sz="2600" noProof="0" dirty="0">
+              <a:t>]</a:t>
+            </a:r>
+          </a:p>
+          <a:p>
+            <a:pPr lvl="1"/>
+            <a:r>
+              <a:rPr lang="en-GB" i="1" noProof="0" dirty="0" err="1">
                 <a:solidFill>
                   <a:schemeClr val="bg1">
                     <a:lumMod val="75000"/>
                   </a:schemeClr>
                 </a:solidFill>
               </a:rPr>
-              <a:t> deletes the rules that exactly looks like the match you specify.</a:t>
-            </a:r>
-          </a:p>
-          <a:p>
-            <a:r>
-              <a:rPr lang="en-GB" sz="2900" noProof="0" dirty="0">
+              <a:t>OFFlowDelete</a:t>
+            </a:r>
+            <a:r>
+              <a:rPr lang="en-GB" noProof="0" dirty="0">
                 <a:solidFill>
                   <a:schemeClr val="bg1">
                     <a:lumMod val="75000"/>
                   </a:schemeClr>
                 </a:solidFill>
               </a:rPr>
-              <a:t>Testing is done in Python using mininet library</a:t>
+              <a:t> deletes rules matching at least the specified fields</a:t>
             </a:r>
           </a:p>
           <a:p>
             <a:pPr lvl="1"/>
-            <a:endParaRPr lang="en-GB" noProof="0" dirty="0"/>
+            <a:r>
+              <a:rPr lang="en-GB" i="1" noProof="0" dirty="0" err="1">
+                <a:solidFill>
+                  <a:schemeClr val="bg1">
+                    <a:lumMod val="75000"/>
+                  </a:schemeClr>
+                </a:solidFill>
+              </a:rPr>
+              <a:t>OFFlowDeleteStrict</a:t>
+            </a:r>
+            <a:r>
+              <a:rPr lang="en-GB" noProof="0" dirty="0">
+                <a:solidFill>
+                  <a:schemeClr val="bg1">
+                    <a:lumMod val="75000"/>
+                  </a:schemeClr>
+                </a:solidFill>
+              </a:rPr>
+              <a:t> deletes the rules that exactly looks like the match you specify</a:t>
+            </a:r>
+          </a:p>
+          <a:p>
+            <a:r>
+              <a:rPr lang="en-GB" noProof="0" dirty="0">
+                <a:solidFill>
+                  <a:schemeClr val="bg1">
+                    <a:lumMod val="75000"/>
+                  </a:schemeClr>
+                </a:solidFill>
+              </a:rPr>
+              <a:t>Testing is done in Python using mininet library and not mininet cli</a:t>
+            </a:r>
+          </a:p>
+          <a:p>
+            <a:pPr lvl="1"/>
+            <a:r>
+              <a:rPr lang="en-GB" dirty="0">
+                <a:solidFill>
+                  <a:schemeClr val="bg1">
+                    <a:lumMod val="75000"/>
+                  </a:schemeClr>
+                </a:solidFill>
+              </a:rPr>
+              <a:t>Due to automating issues for command injection</a:t>
+            </a:r>
+            <a:endParaRPr lang="en-GB" noProof="0" dirty="0">
+              <a:solidFill>
+                <a:schemeClr val="bg1">
+                  <a:lumMod val="75000"/>
+                </a:schemeClr>
+              </a:solidFill>
+            </a:endParaRPr>
           </a:p>
         </p:txBody>
       </p:sp>
@@ -5897,18 +6077,17 @@
           <a:bodyPr/>
           <a:lstStyle/>
           <a:p>
-            <a:fld id="{5BB7E168-F539-4513-AD44-F276B24E7DDF}" type="slidenum">
-              <a:rPr lang="en-GB" smtClean="0"/>
-              <a:t>10</a:t>
-            </a:fld>
-            <a:endParaRPr lang="en-GB"/>
+            <a:r>
+              <a:rPr lang="en-GB" dirty="0"/>
+              <a:t>8</a:t>
+            </a:r>
           </a:p>
         </p:txBody>
       </p:sp>
     </p:spTree>
     <p:extLst>
       <p:ext uri="{BB962C8B-B14F-4D97-AF65-F5344CB8AC3E}">
-        <p14:creationId xmlns:p14="http://schemas.microsoft.com/office/powerpoint/2010/main" val="1033961260"/>
+        <p14:creationId xmlns:p14="http://schemas.microsoft.com/office/powerpoint/2010/main" val="3990882678"/>
       </p:ext>
     </p:extLst>
   </p:cSld>
@@ -5957,7 +6136,11 @@
           <a:lstStyle/>
           <a:p>
             <a:r>
-              <a:rPr lang="en-GB" b="1" noProof="0" dirty="0"/>
+              <a:rPr lang="en-GB" b="1" noProof="0" dirty="0">
+                <a:solidFill>
+                  <a:schemeClr val="tx2"/>
+                </a:solidFill>
+              </a:rPr>
               <a:t>Implementation Issues</a:t>
             </a:r>
           </a:p>
@@ -5979,10 +6162,15 @@
             <p:ph idx="1"/>
           </p:nvPr>
         </p:nvSpPr>
-        <p:spPr/>
+        <p:spPr>
+          <a:xfrm>
+            <a:off x="838200" y="1825625"/>
+            <a:ext cx="10515600" cy="4351338"/>
+          </a:xfrm>
+        </p:spPr>
         <p:txBody>
           <a:bodyPr>
-            <a:normAutofit lnSpcReduction="10000"/>
+            <a:normAutofit fontScale="92500" lnSpcReduction="10000"/>
           </a:bodyPr>
           <a:lstStyle/>
           <a:p>
@@ -6011,18 +6199,32 @@
                   </a:extLst>
                 </a:hlinkClick>
               </a:rPr>
-              <a:t>here</a:t>
-            </a:r>
-            <a:r>
-              <a:rPr lang="en-GB" noProof="0" dirty="0">
+              <a:t>[</a:t>
+            </a:r>
+            <a:r>
+              <a:rPr lang="en-GB" dirty="0">
                 <a:solidFill>
                   <a:schemeClr val="bg1">
                     <a:lumMod val="75000"/>
                   </a:schemeClr>
                 </a:solidFill>
+                <a:hlinkClick r:id="rId3">
+                  <a:extLst>
+                    <a:ext uri="{A12FA001-AC4F-418D-AE19-62706E023703}">
+                      <ahyp:hlinkClr xmlns:ahyp="http://schemas.microsoft.com/office/drawing/2018/hyperlinkcolor" val="tx"/>
+                    </a:ext>
+                  </a:extLst>
+                </a:hlinkClick>
               </a:rPr>
-              <a:t>.</a:t>
-            </a:r>
+              <a:t>1]</a:t>
+            </a:r>
+            <a:endParaRPr lang="en-GB" noProof="0" dirty="0">
+              <a:solidFill>
+                <a:schemeClr val="bg1">
+                  <a:lumMod val="75000"/>
+                </a:schemeClr>
+              </a:solidFill>
+            </a:endParaRPr>
           </a:p>
           <a:p>
             <a:r>
@@ -6053,10 +6255,8 @@
                   </a:schemeClr>
                 </a:solidFill>
               </a:rPr>
-              <a:t>) does not work for non hybrid switches.</a:t>
-            </a:r>
-          </a:p>
-          <a:p>
+              <a:t>) does not work for non hybrid switches </a:t>
+            </a:r>
             <a:r>
               <a:rPr lang="en-GB" noProof="0" dirty="0">
                 <a:solidFill>
@@ -6064,12 +6264,25 @@
                     <a:lumMod val="75000"/>
                   </a:schemeClr>
                 </a:solidFill>
+                <a:hlinkClick r:id="rId4">
+                  <a:extLst>
+                    <a:ext uri="{A12FA001-AC4F-418D-AE19-62706E023703}">
+                      <ahyp:hlinkClr xmlns:ahyp="http://schemas.microsoft.com/office/drawing/2018/hyperlinkcolor" val="tx"/>
+                    </a:ext>
+                  </a:extLst>
+                </a:hlinkClick>
               </a:rPr>
-              <a:t>Learning switch: </a:t>
-            </a:r>
-          </a:p>
-          <a:p>
-            <a:pPr lvl="1"/>
+              <a:t>[2]</a:t>
+            </a:r>
+            <a:endParaRPr lang="en-GB" noProof="0" dirty="0">
+              <a:solidFill>
+                <a:schemeClr val="bg1">
+                  <a:lumMod val="75000"/>
+                </a:schemeClr>
+              </a:solidFill>
+            </a:endParaRPr>
+          </a:p>
+          <a:p>
             <a:r>
               <a:rPr lang="en-GB" noProof="0" dirty="0">
                 <a:solidFill>
@@ -6078,68 +6291,31 @@
                   </a:schemeClr>
                 </a:solidFill>
               </a:rPr>
-              <a:t>Add interface </a:t>
-            </a:r>
-            <a:r>
-              <a:rPr lang="en-GB" dirty="0">
+              <a:t>Learning switch: </a:t>
+            </a:r>
+          </a:p>
+          <a:p>
+            <a:pPr lvl="1"/>
+            <a:r>
+              <a:rPr lang="en-GB" noProof="0" dirty="0">
                 <a:solidFill>
                   <a:schemeClr val="bg1">
                     <a:lumMod val="75000"/>
                   </a:schemeClr>
                 </a:solidFill>
               </a:rPr>
-              <a:t>to retrieve </a:t>
-            </a:r>
-            <a:r>
-              <a:rPr lang="en-GB" noProof="0" dirty="0">
+              <a:t>Added method to </a:t>
+            </a:r>
+            <a:r>
+              <a:rPr lang="en-GB" i="1" noProof="0" dirty="0" err="1">
                 <a:solidFill>
                   <a:schemeClr val="bg1">
                     <a:lumMod val="75000"/>
                   </a:schemeClr>
                 </a:solidFill>
               </a:rPr>
-              <a:t>MAC addresses from the learning switch controller</a:t>
-            </a:r>
-          </a:p>
-          <a:p>
-            <a:r>
-              <a:rPr lang="en-GB" sz="3200" b="1" noProof="0" dirty="0"/>
-              <a:t>Deleting rules are specified </a:t>
-            </a:r>
-            <a:r>
-              <a:rPr lang="en-GB" sz="3200" b="1" noProof="0" dirty="0">
-                <a:hlinkClick r:id="rId4"/>
-              </a:rPr>
-              <a:t>here</a:t>
-            </a:r>
-            <a:r>
-              <a:rPr lang="en-GB" sz="3200" b="1" noProof="0" dirty="0"/>
-              <a:t>. </a:t>
-            </a:r>
-          </a:p>
-          <a:p>
-            <a:pPr lvl="1"/>
-            <a:r>
-              <a:rPr lang="en-GB" sz="2600" b="1" noProof="0" dirty="0" err="1"/>
-              <a:t>OFFlowDelete</a:t>
-            </a:r>
-            <a:r>
-              <a:rPr lang="en-GB" sz="2600" b="1" noProof="0" dirty="0"/>
-              <a:t> deletes rules matching at least the specified fields;</a:t>
-            </a:r>
-          </a:p>
-          <a:p>
-            <a:pPr lvl="1"/>
-            <a:r>
-              <a:rPr lang="en-GB" sz="2600" b="1" noProof="0" dirty="0" err="1"/>
-              <a:t>OFFlowDeleteStrict</a:t>
-            </a:r>
-            <a:r>
-              <a:rPr lang="en-GB" sz="2600" b="1" noProof="0" dirty="0"/>
-              <a:t> deletes the rules that exactly looks like the match you specify.</a:t>
-            </a:r>
-          </a:p>
-          <a:p>
+              <a:t>ILearningSwitch</a:t>
+            </a:r>
             <a:r>
               <a:rPr lang="en-GB" noProof="0" dirty="0">
                 <a:solidFill>
@@ -6148,12 +6324,119 @@
                   </a:schemeClr>
                 </a:solidFill>
               </a:rPr>
-              <a:t>Testing is done in Python using mininet library</a:t>
+              <a:t> </a:t>
+            </a:r>
+            <a:r>
+              <a:rPr lang="en-GB" dirty="0">
+                <a:solidFill>
+                  <a:schemeClr val="bg1">
+                    <a:lumMod val="75000"/>
+                  </a:schemeClr>
+                </a:solidFill>
+              </a:rPr>
+              <a:t>to retrieve learned </a:t>
+            </a:r>
+            <a:r>
+              <a:rPr lang="en-GB" noProof="0" dirty="0">
+                <a:solidFill>
+                  <a:schemeClr val="bg1">
+                    <a:lumMod val="75000"/>
+                  </a:schemeClr>
+                </a:solidFill>
+              </a:rPr>
+              <a:t>port from MAC address</a:t>
+            </a:r>
+          </a:p>
+          <a:p>
+            <a:r>
+              <a:rPr lang="en-GB" sz="3200" b="1" noProof="0" dirty="0"/>
+              <a:t>Deleting rules types </a:t>
+            </a:r>
+            <a:r>
+              <a:rPr lang="en-GB" b="1" noProof="0" dirty="0">
+                <a:solidFill>
+                  <a:schemeClr val="accent1"/>
+                </a:solidFill>
+              </a:rPr>
+              <a:t>[</a:t>
+            </a:r>
+            <a:r>
+              <a:rPr lang="en-GB" b="1" noProof="0" dirty="0">
+                <a:solidFill>
+                  <a:schemeClr val="accent1"/>
+                </a:solidFill>
+                <a:hlinkClick r:id="rId5">
+                  <a:extLst>
+                    <a:ext uri="{A12FA001-AC4F-418D-AE19-62706E023703}">
+                      <ahyp:hlinkClr xmlns:ahyp="http://schemas.microsoft.com/office/drawing/2018/hyperlinkcolor" val="tx"/>
+                    </a:ext>
+                  </a:extLst>
+                </a:hlinkClick>
+              </a:rPr>
+              <a:t>3</a:t>
+            </a:r>
+            <a:r>
+              <a:rPr lang="en-GB" b="1" noProof="0" dirty="0">
+                <a:solidFill>
+                  <a:schemeClr val="accent1"/>
+                </a:solidFill>
+              </a:rPr>
+              <a:t>]</a:t>
             </a:r>
           </a:p>
           <a:p>
             <a:pPr lvl="1"/>
-            <a:endParaRPr lang="en-GB" noProof="0" dirty="0"/>
+            <a:r>
+              <a:rPr lang="en-GB" sz="2800" b="1" i="1" noProof="0" dirty="0" err="1"/>
+              <a:t>OFFlowDelete</a:t>
+            </a:r>
+            <a:r>
+              <a:rPr lang="en-GB" sz="2800" b="1" noProof="0" dirty="0"/>
+              <a:t> deletes rules matching at least the specified fields</a:t>
+            </a:r>
+          </a:p>
+          <a:p>
+            <a:pPr lvl="1"/>
+            <a:r>
+              <a:rPr lang="en-GB" sz="2800" b="1" i="1" noProof="0" dirty="0" err="1"/>
+              <a:t>OFFlowDeleteStrict</a:t>
+            </a:r>
+            <a:r>
+              <a:rPr lang="en-GB" sz="2800" b="1" noProof="0" dirty="0"/>
+              <a:t> deletes the rules that exactly looks like the match you specify</a:t>
+            </a:r>
+          </a:p>
+          <a:p>
+            <a:r>
+              <a:rPr lang="en-GB" noProof="0" dirty="0">
+                <a:solidFill>
+                  <a:schemeClr val="bg1">
+                    <a:lumMod val="75000"/>
+                  </a:schemeClr>
+                </a:solidFill>
+              </a:rPr>
+              <a:t>Testing is done in Python using mininet library and not mininet cli</a:t>
+            </a:r>
+          </a:p>
+          <a:p>
+            <a:pPr lvl="1"/>
+            <a:r>
+              <a:rPr lang="en-GB" dirty="0">
+                <a:solidFill>
+                  <a:schemeClr val="bg1">
+                    <a:lumMod val="75000"/>
+                  </a:schemeClr>
+                </a:solidFill>
+              </a:rPr>
+              <a:t>Due to automating issues for command injection</a:t>
+            </a:r>
+            <a:endParaRPr lang="en-GB" noProof="0" dirty="0">
+              <a:solidFill>
+                <a:schemeClr val="bg1">
+                  <a:lumMod val="75000"/>
+                </a:schemeClr>
+              </a:solidFill>
+            </a:endParaRPr>
           </a:p>
         </p:txBody>
       </p:sp>
@@ -6207,18 +6490,17 @@
           <a:bodyPr/>
           <a:lstStyle/>
           <a:p>
-            <a:fld id="{5BB7E168-F539-4513-AD44-F276B24E7DDF}" type="slidenum">
-              <a:rPr lang="en-GB" smtClean="0"/>
-              <a:t>11</a:t>
-            </a:fld>
-            <a:endParaRPr lang="en-GB"/>
+            <a:r>
+              <a:rPr lang="en-GB" dirty="0"/>
+              <a:t>8</a:t>
+            </a:r>
           </a:p>
         </p:txBody>
       </p:sp>
     </p:spTree>
     <p:extLst>
       <p:ext uri="{BB962C8B-B14F-4D97-AF65-F5344CB8AC3E}">
-        <p14:creationId xmlns:p14="http://schemas.microsoft.com/office/powerpoint/2010/main" val="887066111"/>
+        <p14:creationId xmlns:p14="http://schemas.microsoft.com/office/powerpoint/2010/main" val="2736864451"/>
       </p:ext>
     </p:extLst>
   </p:cSld>
@@ -6267,7 +6549,11 @@
           <a:lstStyle/>
           <a:p>
             <a:r>
-              <a:rPr lang="en-GB" b="1" noProof="0" dirty="0"/>
+              <a:rPr lang="en-GB" b="1" noProof="0" dirty="0">
+                <a:solidFill>
+                  <a:schemeClr val="tx2"/>
+                </a:solidFill>
+              </a:rPr>
               <a:t>Implementation Issues</a:t>
             </a:r>
           </a:p>
@@ -6289,10 +6575,15 @@
             <p:ph idx="1"/>
           </p:nvPr>
         </p:nvSpPr>
-        <p:spPr/>
+        <p:spPr>
+          <a:xfrm>
+            <a:off x="838200" y="1825625"/>
+            <a:ext cx="10515600" cy="4351338"/>
+          </a:xfrm>
+        </p:spPr>
         <p:txBody>
           <a:bodyPr>
-            <a:normAutofit lnSpcReduction="10000"/>
+            <a:normAutofit fontScale="92500"/>
           </a:bodyPr>
           <a:lstStyle/>
           <a:p>
@@ -6321,18 +6612,32 @@
                   </a:extLst>
                 </a:hlinkClick>
               </a:rPr>
-              <a:t>here</a:t>
-            </a:r>
-            <a:r>
-              <a:rPr lang="en-GB" noProof="0" dirty="0">
+              <a:t>[</a:t>
+            </a:r>
+            <a:r>
+              <a:rPr lang="en-GB" dirty="0">
                 <a:solidFill>
                   <a:schemeClr val="bg1">
                     <a:lumMod val="75000"/>
                   </a:schemeClr>
                 </a:solidFill>
+                <a:hlinkClick r:id="rId3">
+                  <a:extLst>
+                    <a:ext uri="{A12FA001-AC4F-418D-AE19-62706E023703}">
+                      <ahyp:hlinkClr xmlns:ahyp="http://schemas.microsoft.com/office/drawing/2018/hyperlinkcolor" val="tx"/>
+                    </a:ext>
+                  </a:extLst>
+                </a:hlinkClick>
               </a:rPr>
-              <a:t>.</a:t>
-            </a:r>
+              <a:t>1]</a:t>
+            </a:r>
+            <a:endParaRPr lang="en-GB" noProof="0" dirty="0">
+              <a:solidFill>
+                <a:schemeClr val="bg1">
+                  <a:lumMod val="75000"/>
+                </a:schemeClr>
+              </a:solidFill>
+            </a:endParaRPr>
           </a:p>
           <a:p>
             <a:r>
@@ -6363,64 +6668,7 @@
                   </a:schemeClr>
                 </a:solidFill>
               </a:rPr>
-              <a:t>) does not work for non hybrid switches.</a:t>
-            </a:r>
-          </a:p>
-          <a:p>
-            <a:r>
-              <a:rPr lang="en-GB" noProof="0" dirty="0">
-                <a:solidFill>
-                  <a:schemeClr val="bg1">
-                    <a:lumMod val="75000"/>
-                  </a:schemeClr>
-                </a:solidFill>
-              </a:rPr>
-              <a:t>Learning switch: </a:t>
-            </a:r>
-          </a:p>
-          <a:p>
-            <a:pPr lvl="1"/>
-            <a:r>
-              <a:rPr lang="en-GB" noProof="0" dirty="0">
-                <a:solidFill>
-                  <a:schemeClr val="bg1">
-                    <a:lumMod val="75000"/>
-                  </a:schemeClr>
-                </a:solidFill>
-              </a:rPr>
-              <a:t>Add interface </a:t>
-            </a:r>
-            <a:r>
-              <a:rPr lang="en-GB" dirty="0">
-                <a:solidFill>
-                  <a:schemeClr val="bg1">
-                    <a:lumMod val="75000"/>
-                  </a:schemeClr>
-                </a:solidFill>
-              </a:rPr>
-              <a:t>to retrieve </a:t>
-            </a:r>
-            <a:r>
-              <a:rPr lang="en-GB" noProof="0" dirty="0">
-                <a:solidFill>
-                  <a:schemeClr val="bg1">
-                    <a:lumMod val="75000"/>
-                  </a:schemeClr>
-                </a:solidFill>
-              </a:rPr>
-              <a:t>MAC addresses from the learning switch controller</a:t>
-            </a:r>
-          </a:p>
-          <a:p>
-            <a:r>
-              <a:rPr lang="en-GB" noProof="0" dirty="0">
-                <a:solidFill>
-                  <a:schemeClr val="bg1">
-                    <a:lumMod val="75000"/>
-                  </a:schemeClr>
-                </a:solidFill>
-              </a:rPr>
-              <a:t>Deleting rules are specified </a:t>
+              <a:t>) does not work for non hybrid switches </a:t>
             </a:r>
             <a:r>
               <a:rPr lang="en-GB" noProof="0" dirty="0">
@@ -6437,8 +6685,17 @@
                   </a:extLst>
                 </a:hlinkClick>
               </a:rPr>
-              <a:t>here</a:t>
-            </a:r>
+              <a:t>[2]</a:t>
+            </a:r>
+            <a:endParaRPr lang="en-GB" noProof="0" dirty="0">
+              <a:solidFill>
+                <a:schemeClr val="bg1">
+                  <a:lumMod val="75000"/>
+                </a:schemeClr>
+              </a:solidFill>
+            </a:endParaRPr>
+          </a:p>
+          <a:p>
             <a:r>
               <a:rPr lang="en-GB" noProof="0" dirty="0">
                 <a:solidFill>
@@ -6447,64 +6704,160 @@
                   </a:schemeClr>
                 </a:solidFill>
               </a:rPr>
-              <a:t>. </a:t>
+              <a:t>Learning switch: </a:t>
             </a:r>
           </a:p>
           <a:p>
             <a:pPr lvl="1"/>
             <a:r>
-              <a:rPr lang="en-GB" noProof="0" dirty="0" err="1">
+              <a:rPr lang="en-GB" noProof="0" dirty="0">
                 <a:solidFill>
                   <a:schemeClr val="bg1">
                     <a:lumMod val="75000"/>
                   </a:schemeClr>
                 </a:solidFill>
               </a:rPr>
-              <a:t>OFFlowDelete</a:t>
-            </a:r>
-            <a:r>
-              <a:rPr lang="en-GB" noProof="0" dirty="0">
+              <a:t>Added method to </a:t>
+            </a:r>
+            <a:r>
+              <a:rPr lang="en-GB" i="1" noProof="0" dirty="0" err="1">
                 <a:solidFill>
                   <a:schemeClr val="bg1">
                     <a:lumMod val="75000"/>
                   </a:schemeClr>
                 </a:solidFill>
               </a:rPr>
-              <a:t> deletes rules matching at least the specified fields;</a:t>
-            </a:r>
-          </a:p>
-          <a:p>
-            <a:pPr lvl="1"/>
-            <a:r>
-              <a:rPr lang="en-GB" noProof="0" dirty="0" err="1">
+              <a:t>ILearningSwitch</a:t>
+            </a:r>
+            <a:r>
+              <a:rPr lang="en-GB" noProof="0" dirty="0">
                 <a:solidFill>
                   <a:schemeClr val="bg1">
                     <a:lumMod val="75000"/>
                   </a:schemeClr>
                 </a:solidFill>
               </a:rPr>
-              <a:t>OFFlowDeleteStrict</a:t>
-            </a:r>
-            <a:r>
-              <a:rPr lang="en-GB" noProof="0" dirty="0">
+              <a:t> </a:t>
+            </a:r>
+            <a:r>
+              <a:rPr lang="en-GB" dirty="0">
                 <a:solidFill>
                   <a:schemeClr val="bg1">
                     <a:lumMod val="75000"/>
                   </a:schemeClr>
                 </a:solidFill>
               </a:rPr>
-              <a:t> deletes the rules that exactly looks like the match you specify.</a:t>
-            </a:r>
-          </a:p>
-          <a:p>
-            <a:r>
-              <a:rPr lang="en-GB" sz="3200" b="1" noProof="0" dirty="0"/>
-              <a:t>Testing is done in Python using mininet library</a:t>
+              <a:t>to retrieve learned </a:t>
+            </a:r>
+            <a:r>
+              <a:rPr lang="en-GB" noProof="0" dirty="0">
+                <a:solidFill>
+                  <a:schemeClr val="bg1">
+                    <a:lumMod val="75000"/>
+                  </a:schemeClr>
+                </a:solidFill>
+              </a:rPr>
+              <a:t>port from MAC address</a:t>
+            </a:r>
+          </a:p>
+          <a:p>
+            <a:r>
+              <a:rPr lang="en-GB" noProof="0" dirty="0">
+                <a:solidFill>
+                  <a:schemeClr val="bg1">
+                    <a:lumMod val="75000"/>
+                  </a:schemeClr>
+                </a:solidFill>
+              </a:rPr>
+              <a:t>Deleting rules types [</a:t>
+            </a:r>
+            <a:r>
+              <a:rPr lang="en-GB" noProof="0" dirty="0">
+                <a:solidFill>
+                  <a:schemeClr val="bg1">
+                    <a:lumMod val="75000"/>
+                  </a:schemeClr>
+                </a:solidFill>
+                <a:hlinkClick r:id="rId5">
+                  <a:extLst>
+                    <a:ext uri="{A12FA001-AC4F-418D-AE19-62706E023703}">
+                      <ahyp:hlinkClr xmlns:ahyp="http://schemas.microsoft.com/office/drawing/2018/hyperlinkcolor" val="tx"/>
+                    </a:ext>
+                  </a:extLst>
+                </a:hlinkClick>
+              </a:rPr>
+              <a:t>3</a:t>
+            </a:r>
+            <a:r>
+              <a:rPr lang="en-GB" noProof="0" dirty="0">
+                <a:solidFill>
+                  <a:schemeClr val="bg1">
+                    <a:lumMod val="75000"/>
+                  </a:schemeClr>
+                </a:solidFill>
+              </a:rPr>
+              <a:t>]</a:t>
             </a:r>
           </a:p>
           <a:p>
             <a:pPr lvl="1"/>
-            <a:endParaRPr lang="en-GB" noProof="0" dirty="0"/>
+            <a:r>
+              <a:rPr lang="en-GB" i="1" noProof="0" dirty="0" err="1">
+                <a:solidFill>
+                  <a:schemeClr val="bg1">
+                    <a:lumMod val="75000"/>
+                  </a:schemeClr>
+                </a:solidFill>
+              </a:rPr>
+              <a:t>OFFlowDelete</a:t>
+            </a:r>
+            <a:r>
+              <a:rPr lang="en-GB" noProof="0" dirty="0">
+                <a:solidFill>
+                  <a:schemeClr val="bg1">
+                    <a:lumMod val="75000"/>
+                  </a:schemeClr>
+                </a:solidFill>
+              </a:rPr>
+              <a:t> deletes rules matching at least the specified fields</a:t>
+            </a:r>
+          </a:p>
+          <a:p>
+            <a:pPr lvl="1"/>
+            <a:r>
+              <a:rPr lang="en-GB" i="1" noProof="0" dirty="0" err="1">
+                <a:solidFill>
+                  <a:schemeClr val="bg1">
+                    <a:lumMod val="75000"/>
+                  </a:schemeClr>
+                </a:solidFill>
+              </a:rPr>
+              <a:t>OFFlowDeleteStrict</a:t>
+            </a:r>
+            <a:r>
+              <a:rPr lang="en-GB" noProof="0" dirty="0">
+                <a:solidFill>
+                  <a:schemeClr val="bg1">
+                    <a:lumMod val="75000"/>
+                  </a:schemeClr>
+                </a:solidFill>
+              </a:rPr>
+              <a:t> deletes the rules that exactly looks like the match you specify</a:t>
+            </a:r>
+          </a:p>
+          <a:p>
+            <a:r>
+              <a:rPr lang="en-GB" sz="3100" b="1" noProof="0" dirty="0"/>
+              <a:t>Testing is done in Python using mininet library and not mininet cli</a:t>
+            </a:r>
+          </a:p>
+          <a:p>
+            <a:pPr lvl="1"/>
+            <a:r>
+              <a:rPr lang="en-GB" sz="2800" b="1" dirty="0"/>
+              <a:t>Due to automating issues for command injection</a:t>
+            </a:r>
+            <a:endParaRPr lang="en-GB" sz="2800" b="1" noProof="0" dirty="0"/>
           </a:p>
         </p:txBody>
       </p:sp>
@@ -6558,18 +6911,17 @@
           <a:bodyPr/>
           <a:lstStyle/>
           <a:p>
-            <a:fld id="{5BB7E168-F539-4513-AD44-F276B24E7DDF}" type="slidenum">
-              <a:rPr lang="en-GB" smtClean="0"/>
-              <a:t>12</a:t>
-            </a:fld>
-            <a:endParaRPr lang="en-GB"/>
+            <a:r>
+              <a:rPr lang="en-GB" dirty="0"/>
+              <a:t>8</a:t>
+            </a:r>
           </a:p>
         </p:txBody>
       </p:sp>
     </p:spTree>
     <p:extLst>
       <p:ext uri="{BB962C8B-B14F-4D97-AF65-F5344CB8AC3E}">
-        <p14:creationId xmlns:p14="http://schemas.microsoft.com/office/powerpoint/2010/main" val="264186129"/>
+        <p14:creationId xmlns:p14="http://schemas.microsoft.com/office/powerpoint/2010/main" val="3900658796"/>
       </p:ext>
     </p:extLst>
   </p:cSld>
@@ -6705,56 +7057,6 @@
       </p:pic>
       <p:sp>
         <p:nvSpPr>
-          <p:cNvPr id="6" name="Segnaposto piè di pagina 5">
-            <a:extLst>
-              <a:ext uri="{FF2B5EF4-FFF2-40B4-BE49-F238E27FC236}">
-                <a16:creationId xmlns:a16="http://schemas.microsoft.com/office/drawing/2014/main" id="{6B127EFB-4BCA-414B-9598-8EAEE6C6008C}"/>
-              </a:ext>
-            </a:extLst>
-          </p:cNvPr>
-          <p:cNvSpPr>
-            <a:spLocks noGrp="1"/>
-          </p:cNvSpPr>
-          <p:nvPr>
-            <p:ph type="ftr" sz="quarter" idx="11"/>
-          </p:nvPr>
-        </p:nvSpPr>
-        <p:spPr>
-          <a:xfrm>
-            <a:off x="838200" y="6356350"/>
-            <a:ext cx="5960951" cy="365125"/>
-          </a:xfrm>
-          <a:noFill/>
-        </p:spPr>
-        <p:txBody>
-          <a:bodyPr vert="horz" lIns="91440" tIns="45720" rIns="91440" bIns="45720" rtlCol="0" anchor="ctr">
-            <a:normAutofit/>
-          </a:bodyPr>
-          <a:lstStyle/>
-          <a:p>
-            <a:pPr algn="l">
-              <a:spcAft>
-                <a:spcPts val="600"/>
-              </a:spcAft>
-            </a:pPr>
-            <a:r>
-              <a:rPr lang="en-US" kern="1200">
-                <a:solidFill>
-                  <a:schemeClr val="tx1">
-                    <a:tint val="75000"/>
-                  </a:schemeClr>
-                </a:solidFill>
-                <a:latin typeface="+mn-lt"/>
-                <a:ea typeface="+mn-ea"/>
-                <a:cs typeface="+mn-cs"/>
-              </a:rPr>
-              <a:t>A. Le Caldare, E. Sassu, E. Scarselli</a:t>
-            </a:r>
-          </a:p>
-        </p:txBody>
-      </p:sp>
-      <p:sp>
-        <p:nvSpPr>
           <p:cNvPr id="7" name="Segnaposto numero diapositiva 6">
             <a:extLst>
               <a:ext uri="{FF2B5EF4-FFF2-40B4-BE49-F238E27FC236}">
@@ -6787,16 +7089,10 @@
                 <a:spcPts val="600"/>
               </a:spcAft>
             </a:pPr>
-            <a:fld id="{5BB7E168-F539-4513-AD44-F276B24E7DDF}" type="slidenum">
-              <a:rPr lang="en-US" smtClean="0"/>
-              <a:pPr algn="l">
-                <a:spcAft>
-                  <a:spcPts val="600"/>
-                </a:spcAft>
-              </a:pPr>
-              <a:t>13</a:t>
-            </a:fld>
-            <a:endParaRPr lang="en-US"/>
+            <a:r>
+              <a:rPr lang="en-US" dirty="0"/>
+              <a:t>9</a:t>
+            </a:r>
           </a:p>
         </p:txBody>
       </p:sp>
@@ -6922,6 +7218,35 @@
               </a:rPr>
               <a:t>MODEL</a:t>
             </a:r>
+          </a:p>
+        </p:txBody>
+      </p:sp>
+      <p:sp>
+        <p:nvSpPr>
+          <p:cNvPr id="5" name="Segnaposto piè di pagina 4">
+            <a:extLst>
+              <a:ext uri="{FF2B5EF4-FFF2-40B4-BE49-F238E27FC236}">
+                <a16:creationId xmlns:a16="http://schemas.microsoft.com/office/drawing/2014/main" id="{FAC2D90C-14D0-4D8A-9210-C5846494F235}"/>
+              </a:ext>
+            </a:extLst>
+          </p:cNvPr>
+          <p:cNvSpPr>
+            <a:spLocks noGrp="1"/>
+          </p:cNvSpPr>
+          <p:nvPr>
+            <p:ph type="ftr" sz="quarter" idx="11"/>
+          </p:nvPr>
+        </p:nvSpPr>
+        <p:spPr/>
+        <p:txBody>
+          <a:bodyPr/>
+          <a:lstStyle/>
+          <a:p>
+            <a:r>
+              <a:rPr lang="it-IT"/>
+              <a:t>A. Le Caldare, E. Sassu, E. Scarselli</a:t>
+            </a:r>
+            <a:endParaRPr lang="en-GB"/>
           </a:p>
         </p:txBody>
       </p:sp>
@@ -7667,301 +7992,58 @@
       </p:sp>
       <p:sp>
         <p:nvSpPr>
-          <p:cNvPr id="26" name="Segnaposto piè di pagina 3">
-            <a:extLst>
-              <a:ext uri="{FF2B5EF4-FFF2-40B4-BE49-F238E27FC236}">
-                <a16:creationId xmlns:a16="http://schemas.microsoft.com/office/drawing/2014/main" id="{F5919EAC-275A-46C3-86EC-C350ABC98A16}"/>
-              </a:ext>
-            </a:extLst>
-          </p:cNvPr>
-          <p:cNvSpPr txBox="1">
-            <a:spLocks/>
-          </p:cNvSpPr>
-          <p:nvPr/>
-        </p:nvSpPr>
-        <p:spPr>
-          <a:xfrm>
-            <a:off x="750242" y="6092880"/>
-            <a:ext cx="3246992" cy="617260"/>
-          </a:xfrm>
-          <a:prstGeom prst="rect">
-            <a:avLst/>
-          </a:prstGeom>
-        </p:spPr>
-        <p:txBody>
-          <a:bodyPr vert="horz" lIns="91440" tIns="45720" rIns="91440" bIns="45720" rtlCol="0" anchor="ctr">
-            <a:normAutofit/>
-          </a:bodyPr>
-          <a:lstStyle>
-            <a:defPPr>
-              <a:defRPr lang="en-US"/>
-            </a:defPPr>
-            <a:lvl1pPr marL="0" algn="ctr" defTabSz="914400" rtl="0" eaLnBrk="1" latinLnBrk="0" hangingPunct="1">
-              <a:defRPr sz="1200" kern="1200">
-                <a:solidFill>
-                  <a:schemeClr val="tx1">
-                    <a:tint val="75000"/>
-                  </a:schemeClr>
-                </a:solidFill>
-                <a:latin typeface="+mn-lt"/>
-                <a:ea typeface="+mn-ea"/>
-                <a:cs typeface="+mn-cs"/>
-              </a:defRPr>
-            </a:lvl1pPr>
-            <a:lvl2pPr marL="457200" algn="l" defTabSz="914400" rtl="0" eaLnBrk="1" latinLnBrk="0" hangingPunct="1">
-              <a:defRPr sz="1800" kern="1200">
-                <a:solidFill>
-                  <a:schemeClr val="tx1"/>
-                </a:solidFill>
-                <a:latin typeface="+mn-lt"/>
-                <a:ea typeface="+mn-ea"/>
-                <a:cs typeface="+mn-cs"/>
-              </a:defRPr>
-            </a:lvl2pPr>
-            <a:lvl3pPr marL="914400" algn="l" defTabSz="914400" rtl="0" eaLnBrk="1" latinLnBrk="0" hangingPunct="1">
-              <a:defRPr sz="1800" kern="1200">
-                <a:solidFill>
-                  <a:schemeClr val="tx1"/>
-                </a:solidFill>
-                <a:latin typeface="+mn-lt"/>
-                <a:ea typeface="+mn-ea"/>
-                <a:cs typeface="+mn-cs"/>
-              </a:defRPr>
-            </a:lvl3pPr>
-            <a:lvl4pPr marL="1371600" algn="l" defTabSz="914400" rtl="0" eaLnBrk="1" latinLnBrk="0" hangingPunct="1">
-              <a:defRPr sz="1800" kern="1200">
-                <a:solidFill>
-                  <a:schemeClr val="tx1"/>
-                </a:solidFill>
-                <a:latin typeface="+mn-lt"/>
-                <a:ea typeface="+mn-ea"/>
-                <a:cs typeface="+mn-cs"/>
-              </a:defRPr>
-            </a:lvl4pPr>
-            <a:lvl5pPr marL="1828800" algn="l" defTabSz="914400" rtl="0" eaLnBrk="1" latinLnBrk="0" hangingPunct="1">
-              <a:defRPr sz="1800" kern="1200">
-                <a:solidFill>
-                  <a:schemeClr val="tx1"/>
-                </a:solidFill>
-                <a:latin typeface="+mn-lt"/>
-                <a:ea typeface="+mn-ea"/>
-                <a:cs typeface="+mn-cs"/>
-              </a:defRPr>
-            </a:lvl5pPr>
-            <a:lvl6pPr marL="2286000" algn="l" defTabSz="914400" rtl="0" eaLnBrk="1" latinLnBrk="0" hangingPunct="1">
-              <a:defRPr sz="1800" kern="1200">
-                <a:solidFill>
-                  <a:schemeClr val="tx1"/>
-                </a:solidFill>
-                <a:latin typeface="+mn-lt"/>
-                <a:ea typeface="+mn-ea"/>
-                <a:cs typeface="+mn-cs"/>
-              </a:defRPr>
-            </a:lvl6pPr>
-            <a:lvl7pPr marL="2743200" algn="l" defTabSz="914400" rtl="0" eaLnBrk="1" latinLnBrk="0" hangingPunct="1">
-              <a:defRPr sz="1800" kern="1200">
-                <a:solidFill>
-                  <a:schemeClr val="tx1"/>
-                </a:solidFill>
-                <a:latin typeface="+mn-lt"/>
-                <a:ea typeface="+mn-ea"/>
-                <a:cs typeface="+mn-cs"/>
-              </a:defRPr>
-            </a:lvl7pPr>
-            <a:lvl8pPr marL="3200400" algn="l" defTabSz="914400" rtl="0" eaLnBrk="1" latinLnBrk="0" hangingPunct="1">
-              <a:defRPr sz="1800" kern="1200">
-                <a:solidFill>
-                  <a:schemeClr val="tx1"/>
-                </a:solidFill>
-                <a:latin typeface="+mn-lt"/>
-                <a:ea typeface="+mn-ea"/>
-                <a:cs typeface="+mn-cs"/>
-              </a:defRPr>
-            </a:lvl8pPr>
-            <a:lvl9pPr marL="3657600" algn="l" defTabSz="914400" rtl="0" eaLnBrk="1" latinLnBrk="0" hangingPunct="1">
-              <a:defRPr sz="1800" kern="1200">
-                <a:solidFill>
-                  <a:schemeClr val="tx1"/>
-                </a:solidFill>
-                <a:latin typeface="+mn-lt"/>
-                <a:ea typeface="+mn-ea"/>
-                <a:cs typeface="+mn-cs"/>
-              </a:defRPr>
-            </a:lvl9pPr>
-          </a:lstStyle>
-          <a:p>
-            <a:pPr algn="l">
-              <a:spcAft>
-                <a:spcPts val="600"/>
-              </a:spcAft>
-            </a:pPr>
-            <a:r>
-              <a:rPr lang="it-IT" sz="1100">
-                <a:solidFill>
-                  <a:schemeClr val="tx1"/>
-                </a:solidFill>
-              </a:rPr>
+          <p:cNvPr id="2" name="Segnaposto piè di pagina 1">
+            <a:extLst>
+              <a:ext uri="{FF2B5EF4-FFF2-40B4-BE49-F238E27FC236}">
+                <a16:creationId xmlns:a16="http://schemas.microsoft.com/office/drawing/2014/main" id="{C46081FB-FBE7-4724-86C5-82829583E4E1}"/>
+              </a:ext>
+            </a:extLst>
+          </p:cNvPr>
+          <p:cNvSpPr>
+            <a:spLocks noGrp="1"/>
+          </p:cNvSpPr>
+          <p:nvPr>
+            <p:ph type="ftr" sz="quarter" idx="11"/>
+          </p:nvPr>
+        </p:nvSpPr>
+        <p:spPr/>
+        <p:txBody>
+          <a:bodyPr/>
+          <a:lstStyle/>
+          <a:p>
+            <a:r>
+              <a:rPr lang="it-IT"/>
               <a:t>A. Le Caldare, E. Sassu, E. Scarselli</a:t>
             </a:r>
-            <a:endParaRPr lang="en-GB" sz="1100" dirty="0">
-              <a:solidFill>
-                <a:schemeClr val="tx1"/>
-              </a:solidFill>
-            </a:endParaRPr>
-          </a:p>
-        </p:txBody>
-      </p:sp>
-      <p:sp>
-        <p:nvSpPr>
-          <p:cNvPr id="27" name="Segnaposto numero diapositiva 4">
-            <a:extLst>
-              <a:ext uri="{FF2B5EF4-FFF2-40B4-BE49-F238E27FC236}">
-                <a16:creationId xmlns:a16="http://schemas.microsoft.com/office/drawing/2014/main" id="{144FA246-62DE-4D8A-B3A7-E14DD88F9E99}"/>
-              </a:ext>
-            </a:extLst>
-          </p:cNvPr>
-          <p:cNvSpPr txBox="1">
-            <a:spLocks/>
-          </p:cNvSpPr>
-          <p:nvPr/>
-        </p:nvSpPr>
-        <p:spPr>
-          <a:xfrm>
-            <a:off x="11000232" y="6108192"/>
-            <a:ext cx="548640" cy="548640"/>
-          </a:xfrm>
-          <a:prstGeom prst="ellipse">
-            <a:avLst/>
-          </a:prstGeom>
-          <a:solidFill>
-            <a:srgbClr val="368B50"/>
-          </a:solidFill>
-        </p:spPr>
-        <p:txBody>
-          <a:bodyPr vert="horz" lIns="91440" tIns="45720" rIns="91440" bIns="45720" rtlCol="0" anchor="ctr">
-            <a:normAutofit/>
-          </a:bodyPr>
-          <a:lstStyle>
-            <a:defPPr>
-              <a:defRPr lang="en-US"/>
-            </a:defPPr>
-            <a:lvl1pPr marL="0" algn="r" defTabSz="914400" rtl="0" eaLnBrk="1" latinLnBrk="0" hangingPunct="1">
-              <a:defRPr sz="1200" kern="1200">
-                <a:solidFill>
-                  <a:schemeClr val="tx1">
-                    <a:tint val="75000"/>
-                  </a:schemeClr>
-                </a:solidFill>
-                <a:latin typeface="+mn-lt"/>
-                <a:ea typeface="+mn-ea"/>
-                <a:cs typeface="+mn-cs"/>
-              </a:defRPr>
-            </a:lvl1pPr>
-            <a:lvl2pPr marL="457200" algn="l" defTabSz="914400" rtl="0" eaLnBrk="1" latinLnBrk="0" hangingPunct="1">
-              <a:defRPr sz="1800" kern="1200">
-                <a:solidFill>
-                  <a:schemeClr val="tx1"/>
-                </a:solidFill>
-                <a:latin typeface="+mn-lt"/>
-                <a:ea typeface="+mn-ea"/>
-                <a:cs typeface="+mn-cs"/>
-              </a:defRPr>
-            </a:lvl2pPr>
-            <a:lvl3pPr marL="914400" algn="l" defTabSz="914400" rtl="0" eaLnBrk="1" latinLnBrk="0" hangingPunct="1">
-              <a:defRPr sz="1800" kern="1200">
-                <a:solidFill>
-                  <a:schemeClr val="tx1"/>
-                </a:solidFill>
-                <a:latin typeface="+mn-lt"/>
-                <a:ea typeface="+mn-ea"/>
-                <a:cs typeface="+mn-cs"/>
-              </a:defRPr>
-            </a:lvl3pPr>
-            <a:lvl4pPr marL="1371600" algn="l" defTabSz="914400" rtl="0" eaLnBrk="1" latinLnBrk="0" hangingPunct="1">
-              <a:defRPr sz="1800" kern="1200">
-                <a:solidFill>
-                  <a:schemeClr val="tx1"/>
-                </a:solidFill>
-                <a:latin typeface="+mn-lt"/>
-                <a:ea typeface="+mn-ea"/>
-                <a:cs typeface="+mn-cs"/>
-              </a:defRPr>
-            </a:lvl4pPr>
-            <a:lvl5pPr marL="1828800" algn="l" defTabSz="914400" rtl="0" eaLnBrk="1" latinLnBrk="0" hangingPunct="1">
-              <a:defRPr sz="1800" kern="1200">
-                <a:solidFill>
-                  <a:schemeClr val="tx1"/>
-                </a:solidFill>
-                <a:latin typeface="+mn-lt"/>
-                <a:ea typeface="+mn-ea"/>
-                <a:cs typeface="+mn-cs"/>
-              </a:defRPr>
-            </a:lvl5pPr>
-            <a:lvl6pPr marL="2286000" algn="l" defTabSz="914400" rtl="0" eaLnBrk="1" latinLnBrk="0" hangingPunct="1">
-              <a:defRPr sz="1800" kern="1200">
-                <a:solidFill>
-                  <a:schemeClr val="tx1"/>
-                </a:solidFill>
-                <a:latin typeface="+mn-lt"/>
-                <a:ea typeface="+mn-ea"/>
-                <a:cs typeface="+mn-cs"/>
-              </a:defRPr>
-            </a:lvl6pPr>
-            <a:lvl7pPr marL="2743200" algn="l" defTabSz="914400" rtl="0" eaLnBrk="1" latinLnBrk="0" hangingPunct="1">
-              <a:defRPr sz="1800" kern="1200">
-                <a:solidFill>
-                  <a:schemeClr val="tx1"/>
-                </a:solidFill>
-                <a:latin typeface="+mn-lt"/>
-                <a:ea typeface="+mn-ea"/>
-                <a:cs typeface="+mn-cs"/>
-              </a:defRPr>
-            </a:lvl7pPr>
-            <a:lvl8pPr marL="3200400" algn="l" defTabSz="914400" rtl="0" eaLnBrk="1" latinLnBrk="0" hangingPunct="1">
-              <a:defRPr sz="1800" kern="1200">
-                <a:solidFill>
-                  <a:schemeClr val="tx1"/>
-                </a:solidFill>
-                <a:latin typeface="+mn-lt"/>
-                <a:ea typeface="+mn-ea"/>
-                <a:cs typeface="+mn-cs"/>
-              </a:defRPr>
-            </a:lvl8pPr>
-            <a:lvl9pPr marL="3657600" algn="l" defTabSz="914400" rtl="0" eaLnBrk="1" latinLnBrk="0" hangingPunct="1">
-              <a:defRPr sz="1800" kern="1200">
-                <a:solidFill>
-                  <a:schemeClr val="tx1"/>
-                </a:solidFill>
-                <a:latin typeface="+mn-lt"/>
-                <a:ea typeface="+mn-ea"/>
-                <a:cs typeface="+mn-cs"/>
-              </a:defRPr>
-            </a:lvl9pPr>
-          </a:lstStyle>
-          <a:p>
-            <a:pPr algn="ctr">
-              <a:spcAft>
-                <a:spcPts val="600"/>
-              </a:spcAft>
-            </a:pPr>
-            <a:fld id="{5BB7E168-F539-4513-AD44-F276B24E7DDF}" type="slidenum">
-              <a:rPr lang="en-GB" sz="1500" smtClean="0">
-                <a:solidFill>
-                  <a:srgbClr val="FFFFFF"/>
-                </a:solidFill>
-              </a:rPr>
-              <a:pPr algn="ctr">
-                <a:spcAft>
-                  <a:spcPts val="600"/>
-                </a:spcAft>
-              </a:pPr>
-              <a:t>14</a:t>
-            </a:fld>
-            <a:endParaRPr lang="en-GB" sz="1500">
-              <a:solidFill>
-                <a:srgbClr val="FFFFFF"/>
-              </a:solidFill>
-            </a:endParaRPr>
+            <a:endParaRPr lang="en-GB"/>
+          </a:p>
+        </p:txBody>
+      </p:sp>
+      <p:sp>
+        <p:nvSpPr>
+          <p:cNvPr id="3" name="Segnaposto numero diapositiva 2">
+            <a:extLst>
+              <a:ext uri="{FF2B5EF4-FFF2-40B4-BE49-F238E27FC236}">
+                <a16:creationId xmlns:a16="http://schemas.microsoft.com/office/drawing/2014/main" id="{2169F94A-3284-4E4B-8D18-D9A542BB4FD0}"/>
+              </a:ext>
+            </a:extLst>
+          </p:cNvPr>
+          <p:cNvSpPr>
+            <a:spLocks noGrp="1"/>
+          </p:cNvSpPr>
+          <p:nvPr>
+            <p:ph type="sldNum" sz="quarter" idx="12"/>
+          </p:nvPr>
+        </p:nvSpPr>
+        <p:spPr/>
+        <p:txBody>
+          <a:bodyPr/>
+          <a:lstStyle/>
+          <a:p>
+            <a:r>
+              <a:rPr lang="en-GB" dirty="0"/>
+              <a:t>10</a:t>
+            </a:r>
           </a:p>
         </p:txBody>
       </p:sp>
@@ -8654,306 +8736,6 @@
           </a:p>
         </p:txBody>
       </p:sp>
-      <p:sp>
-        <p:nvSpPr>
-          <p:cNvPr id="26" name="Segnaposto piè di pagina 3">
-            <a:extLst>
-              <a:ext uri="{FF2B5EF4-FFF2-40B4-BE49-F238E27FC236}">
-                <a16:creationId xmlns:a16="http://schemas.microsoft.com/office/drawing/2014/main" id="{F5919EAC-275A-46C3-86EC-C350ABC98A16}"/>
-              </a:ext>
-            </a:extLst>
-          </p:cNvPr>
-          <p:cNvSpPr txBox="1">
-            <a:spLocks/>
-          </p:cNvSpPr>
-          <p:nvPr/>
-        </p:nvSpPr>
-        <p:spPr>
-          <a:xfrm>
-            <a:off x="750242" y="6092880"/>
-            <a:ext cx="3246992" cy="617260"/>
-          </a:xfrm>
-          <a:prstGeom prst="rect">
-            <a:avLst/>
-          </a:prstGeom>
-        </p:spPr>
-        <p:txBody>
-          <a:bodyPr vert="horz" lIns="91440" tIns="45720" rIns="91440" bIns="45720" rtlCol="0" anchor="ctr">
-            <a:normAutofit/>
-          </a:bodyPr>
-          <a:lstStyle>
-            <a:defPPr>
-              <a:defRPr lang="en-US"/>
-            </a:defPPr>
-            <a:lvl1pPr marL="0" algn="ctr" defTabSz="914400" rtl="0" eaLnBrk="1" latinLnBrk="0" hangingPunct="1">
-              <a:defRPr sz="1200" kern="1200">
-                <a:solidFill>
-                  <a:schemeClr val="tx1">
-                    <a:tint val="75000"/>
-                  </a:schemeClr>
-                </a:solidFill>
-                <a:latin typeface="+mn-lt"/>
-                <a:ea typeface="+mn-ea"/>
-                <a:cs typeface="+mn-cs"/>
-              </a:defRPr>
-            </a:lvl1pPr>
-            <a:lvl2pPr marL="457200" algn="l" defTabSz="914400" rtl="0" eaLnBrk="1" latinLnBrk="0" hangingPunct="1">
-              <a:defRPr sz="1800" kern="1200">
-                <a:solidFill>
-                  <a:schemeClr val="tx1"/>
-                </a:solidFill>
-                <a:latin typeface="+mn-lt"/>
-                <a:ea typeface="+mn-ea"/>
-                <a:cs typeface="+mn-cs"/>
-              </a:defRPr>
-            </a:lvl2pPr>
-            <a:lvl3pPr marL="914400" algn="l" defTabSz="914400" rtl="0" eaLnBrk="1" latinLnBrk="0" hangingPunct="1">
-              <a:defRPr sz="1800" kern="1200">
-                <a:solidFill>
-                  <a:schemeClr val="tx1"/>
-                </a:solidFill>
-                <a:latin typeface="+mn-lt"/>
-                <a:ea typeface="+mn-ea"/>
-                <a:cs typeface="+mn-cs"/>
-              </a:defRPr>
-            </a:lvl3pPr>
-            <a:lvl4pPr marL="1371600" algn="l" defTabSz="914400" rtl="0" eaLnBrk="1" latinLnBrk="0" hangingPunct="1">
-              <a:defRPr sz="1800" kern="1200">
-                <a:solidFill>
-                  <a:schemeClr val="tx1"/>
-                </a:solidFill>
-                <a:latin typeface="+mn-lt"/>
-                <a:ea typeface="+mn-ea"/>
-                <a:cs typeface="+mn-cs"/>
-              </a:defRPr>
-            </a:lvl4pPr>
-            <a:lvl5pPr marL="1828800" algn="l" defTabSz="914400" rtl="0" eaLnBrk="1" latinLnBrk="0" hangingPunct="1">
-              <a:defRPr sz="1800" kern="1200">
-                <a:solidFill>
-                  <a:schemeClr val="tx1"/>
-                </a:solidFill>
-                <a:latin typeface="+mn-lt"/>
-                <a:ea typeface="+mn-ea"/>
-                <a:cs typeface="+mn-cs"/>
-              </a:defRPr>
-            </a:lvl5pPr>
-            <a:lvl6pPr marL="2286000" algn="l" defTabSz="914400" rtl="0" eaLnBrk="1" latinLnBrk="0" hangingPunct="1">
-              <a:defRPr sz="1800" kern="1200">
-                <a:solidFill>
-                  <a:schemeClr val="tx1"/>
-                </a:solidFill>
-                <a:latin typeface="+mn-lt"/>
-                <a:ea typeface="+mn-ea"/>
-                <a:cs typeface="+mn-cs"/>
-              </a:defRPr>
-            </a:lvl6pPr>
-            <a:lvl7pPr marL="2743200" algn="l" defTabSz="914400" rtl="0" eaLnBrk="1" latinLnBrk="0" hangingPunct="1">
-              <a:defRPr sz="1800" kern="1200">
-                <a:solidFill>
-                  <a:schemeClr val="tx1"/>
-                </a:solidFill>
-                <a:latin typeface="+mn-lt"/>
-                <a:ea typeface="+mn-ea"/>
-                <a:cs typeface="+mn-cs"/>
-              </a:defRPr>
-            </a:lvl7pPr>
-            <a:lvl8pPr marL="3200400" algn="l" defTabSz="914400" rtl="0" eaLnBrk="1" latinLnBrk="0" hangingPunct="1">
-              <a:defRPr sz="1800" kern="1200">
-                <a:solidFill>
-                  <a:schemeClr val="tx1"/>
-                </a:solidFill>
-                <a:latin typeface="+mn-lt"/>
-                <a:ea typeface="+mn-ea"/>
-                <a:cs typeface="+mn-cs"/>
-              </a:defRPr>
-            </a:lvl8pPr>
-            <a:lvl9pPr marL="3657600" algn="l" defTabSz="914400" rtl="0" eaLnBrk="1" latinLnBrk="0" hangingPunct="1">
-              <a:defRPr sz="1800" kern="1200">
-                <a:solidFill>
-                  <a:schemeClr val="tx1"/>
-                </a:solidFill>
-                <a:latin typeface="+mn-lt"/>
-                <a:ea typeface="+mn-ea"/>
-                <a:cs typeface="+mn-cs"/>
-              </a:defRPr>
-            </a:lvl9pPr>
-          </a:lstStyle>
-          <a:p>
-            <a:pPr algn="l">
-              <a:spcAft>
-                <a:spcPts val="600"/>
-              </a:spcAft>
-            </a:pPr>
-            <a:r>
-              <a:rPr lang="it-IT" sz="1100">
-                <a:solidFill>
-                  <a:schemeClr val="tx1"/>
-                </a:solidFill>
-              </a:rPr>
-              <a:t>A. Le Caldare, E. Sassu, E. Scarselli</a:t>
-            </a:r>
-            <a:endParaRPr lang="en-GB" sz="1100" dirty="0">
-              <a:solidFill>
-                <a:schemeClr val="tx1"/>
-              </a:solidFill>
-            </a:endParaRPr>
-          </a:p>
-        </p:txBody>
-      </p:sp>
-      <p:sp>
-        <p:nvSpPr>
-          <p:cNvPr id="27" name="Segnaposto numero diapositiva 4">
-            <a:extLst>
-              <a:ext uri="{FF2B5EF4-FFF2-40B4-BE49-F238E27FC236}">
-                <a16:creationId xmlns:a16="http://schemas.microsoft.com/office/drawing/2014/main" id="{144FA246-62DE-4D8A-B3A7-E14DD88F9E99}"/>
-              </a:ext>
-            </a:extLst>
-          </p:cNvPr>
-          <p:cNvSpPr txBox="1">
-            <a:spLocks/>
-          </p:cNvSpPr>
-          <p:nvPr/>
-        </p:nvSpPr>
-        <p:spPr>
-          <a:xfrm>
-            <a:off x="11000232" y="6108192"/>
-            <a:ext cx="548640" cy="548640"/>
-          </a:xfrm>
-          <a:prstGeom prst="ellipse">
-            <a:avLst/>
-          </a:prstGeom>
-          <a:solidFill>
-            <a:srgbClr val="368B50"/>
-          </a:solidFill>
-        </p:spPr>
-        <p:txBody>
-          <a:bodyPr vert="horz" lIns="91440" tIns="45720" rIns="91440" bIns="45720" rtlCol="0" anchor="ctr">
-            <a:normAutofit/>
-          </a:bodyPr>
-          <a:lstStyle>
-            <a:defPPr>
-              <a:defRPr lang="en-US"/>
-            </a:defPPr>
-            <a:lvl1pPr marL="0" algn="r" defTabSz="914400" rtl="0" eaLnBrk="1" latinLnBrk="0" hangingPunct="1">
-              <a:defRPr sz="1200" kern="1200">
-                <a:solidFill>
-                  <a:schemeClr val="tx1">
-                    <a:tint val="75000"/>
-                  </a:schemeClr>
-                </a:solidFill>
-                <a:latin typeface="+mn-lt"/>
-                <a:ea typeface="+mn-ea"/>
-                <a:cs typeface="+mn-cs"/>
-              </a:defRPr>
-            </a:lvl1pPr>
-            <a:lvl2pPr marL="457200" algn="l" defTabSz="914400" rtl="0" eaLnBrk="1" latinLnBrk="0" hangingPunct="1">
-              <a:defRPr sz="1800" kern="1200">
-                <a:solidFill>
-                  <a:schemeClr val="tx1"/>
-                </a:solidFill>
-                <a:latin typeface="+mn-lt"/>
-                <a:ea typeface="+mn-ea"/>
-                <a:cs typeface="+mn-cs"/>
-              </a:defRPr>
-            </a:lvl2pPr>
-            <a:lvl3pPr marL="914400" algn="l" defTabSz="914400" rtl="0" eaLnBrk="1" latinLnBrk="0" hangingPunct="1">
-              <a:defRPr sz="1800" kern="1200">
-                <a:solidFill>
-                  <a:schemeClr val="tx1"/>
-                </a:solidFill>
-                <a:latin typeface="+mn-lt"/>
-                <a:ea typeface="+mn-ea"/>
-                <a:cs typeface="+mn-cs"/>
-              </a:defRPr>
-            </a:lvl3pPr>
-            <a:lvl4pPr marL="1371600" algn="l" defTabSz="914400" rtl="0" eaLnBrk="1" latinLnBrk="0" hangingPunct="1">
-              <a:defRPr sz="1800" kern="1200">
-                <a:solidFill>
-                  <a:schemeClr val="tx1"/>
-                </a:solidFill>
-                <a:latin typeface="+mn-lt"/>
-                <a:ea typeface="+mn-ea"/>
-                <a:cs typeface="+mn-cs"/>
-              </a:defRPr>
-            </a:lvl4pPr>
-            <a:lvl5pPr marL="1828800" algn="l" defTabSz="914400" rtl="0" eaLnBrk="1" latinLnBrk="0" hangingPunct="1">
-              <a:defRPr sz="1800" kern="1200">
-                <a:solidFill>
-                  <a:schemeClr val="tx1"/>
-                </a:solidFill>
-                <a:latin typeface="+mn-lt"/>
-                <a:ea typeface="+mn-ea"/>
-                <a:cs typeface="+mn-cs"/>
-              </a:defRPr>
-            </a:lvl5pPr>
-            <a:lvl6pPr marL="2286000" algn="l" defTabSz="914400" rtl="0" eaLnBrk="1" latinLnBrk="0" hangingPunct="1">
-              <a:defRPr sz="1800" kern="1200">
-                <a:solidFill>
-                  <a:schemeClr val="tx1"/>
-                </a:solidFill>
-                <a:latin typeface="+mn-lt"/>
-                <a:ea typeface="+mn-ea"/>
-                <a:cs typeface="+mn-cs"/>
-              </a:defRPr>
-            </a:lvl6pPr>
-            <a:lvl7pPr marL="2743200" algn="l" defTabSz="914400" rtl="0" eaLnBrk="1" latinLnBrk="0" hangingPunct="1">
-              <a:defRPr sz="1800" kern="1200">
-                <a:solidFill>
-                  <a:schemeClr val="tx1"/>
-                </a:solidFill>
-                <a:latin typeface="+mn-lt"/>
-                <a:ea typeface="+mn-ea"/>
-                <a:cs typeface="+mn-cs"/>
-              </a:defRPr>
-            </a:lvl7pPr>
-            <a:lvl8pPr marL="3200400" algn="l" defTabSz="914400" rtl="0" eaLnBrk="1" latinLnBrk="0" hangingPunct="1">
-              <a:defRPr sz="1800" kern="1200">
-                <a:solidFill>
-                  <a:schemeClr val="tx1"/>
-                </a:solidFill>
-                <a:latin typeface="+mn-lt"/>
-                <a:ea typeface="+mn-ea"/>
-                <a:cs typeface="+mn-cs"/>
-              </a:defRPr>
-            </a:lvl8pPr>
-            <a:lvl9pPr marL="3657600" algn="l" defTabSz="914400" rtl="0" eaLnBrk="1" latinLnBrk="0" hangingPunct="1">
-              <a:defRPr sz="1800" kern="1200">
-                <a:solidFill>
-                  <a:schemeClr val="tx1"/>
-                </a:solidFill>
-                <a:latin typeface="+mn-lt"/>
-                <a:ea typeface="+mn-ea"/>
-                <a:cs typeface="+mn-cs"/>
-              </a:defRPr>
-            </a:lvl9pPr>
-          </a:lstStyle>
-          <a:p>
-            <a:pPr algn="ctr">
-              <a:spcAft>
-                <a:spcPts val="600"/>
-              </a:spcAft>
-            </a:pPr>
-            <a:fld id="{5BB7E168-F539-4513-AD44-F276B24E7DDF}" type="slidenum">
-              <a:rPr lang="en-GB" sz="1500" smtClean="0">
-                <a:solidFill>
-                  <a:srgbClr val="FFFFFF"/>
-                </a:solidFill>
-              </a:rPr>
-              <a:pPr algn="ctr">
-                <a:spcAft>
-                  <a:spcPts val="600"/>
-                </a:spcAft>
-              </a:pPr>
-              <a:t>15</a:t>
-            </a:fld>
-            <a:endParaRPr lang="en-GB" sz="1500">
-              <a:solidFill>
-                <a:srgbClr val="FFFFFF"/>
-              </a:solidFill>
-            </a:endParaRPr>
-          </a:p>
-        </p:txBody>
-      </p:sp>
       <p:pic>
         <p:nvPicPr>
           <p:cNvPr id="3" name="Immagine 2">
@@ -8990,6 +8772,64 @@
           </a:prstGeom>
         </p:spPr>
       </p:pic>
+      <p:sp>
+        <p:nvSpPr>
+          <p:cNvPr id="2" name="Segnaposto piè di pagina 1">
+            <a:extLst>
+              <a:ext uri="{FF2B5EF4-FFF2-40B4-BE49-F238E27FC236}">
+                <a16:creationId xmlns:a16="http://schemas.microsoft.com/office/drawing/2014/main" id="{03446EDC-DAEB-4561-8A59-88BEECE9C7BD}"/>
+              </a:ext>
+            </a:extLst>
+          </p:cNvPr>
+          <p:cNvSpPr>
+            <a:spLocks noGrp="1"/>
+          </p:cNvSpPr>
+          <p:nvPr>
+            <p:ph type="ftr" sz="quarter" idx="11"/>
+          </p:nvPr>
+        </p:nvSpPr>
+        <p:spPr/>
+        <p:txBody>
+          <a:bodyPr/>
+          <a:lstStyle/>
+          <a:p>
+            <a:r>
+              <a:rPr lang="it-IT"/>
+              <a:t>A. Le Caldare, E. Sassu, E. Scarselli</a:t>
+            </a:r>
+            <a:endParaRPr lang="en-GB"/>
+          </a:p>
+        </p:txBody>
+      </p:sp>
+      <p:sp>
+        <p:nvSpPr>
+          <p:cNvPr id="4" name="Segnaposto numero diapositiva 3">
+            <a:extLst>
+              <a:ext uri="{FF2B5EF4-FFF2-40B4-BE49-F238E27FC236}">
+                <a16:creationId xmlns:a16="http://schemas.microsoft.com/office/drawing/2014/main" id="{51F41A5D-C183-43E7-9836-7A0162A5C415}"/>
+              </a:ext>
+            </a:extLst>
+          </p:cNvPr>
+          <p:cNvSpPr>
+            <a:spLocks noGrp="1"/>
+          </p:cNvSpPr>
+          <p:nvPr>
+            <p:ph type="sldNum" sz="quarter" idx="12"/>
+          </p:nvPr>
+        </p:nvSpPr>
+        <p:spPr/>
+        <p:txBody>
+          <a:bodyPr/>
+          <a:lstStyle/>
+          <a:p>
+            <a:r>
+              <a:rPr lang="it-IT" dirty="0"/>
+              <a:t>11</a:t>
+            </a:r>
+            <a:endParaRPr lang="en-GB" dirty="0"/>
+          </a:p>
+        </p:txBody>
+      </p:sp>
     </p:spTree>
     <p:extLst>
       <p:ext uri="{BB962C8B-B14F-4D97-AF65-F5344CB8AC3E}">
@@ -9714,306 +9554,6 @@
           </a:p>
         </p:txBody>
       </p:sp>
-      <p:sp>
-        <p:nvSpPr>
-          <p:cNvPr id="26" name="Segnaposto piè di pagina 3">
-            <a:extLst>
-              <a:ext uri="{FF2B5EF4-FFF2-40B4-BE49-F238E27FC236}">
-                <a16:creationId xmlns:a16="http://schemas.microsoft.com/office/drawing/2014/main" id="{F5919EAC-275A-46C3-86EC-C350ABC98A16}"/>
-              </a:ext>
-            </a:extLst>
-          </p:cNvPr>
-          <p:cNvSpPr txBox="1">
-            <a:spLocks/>
-          </p:cNvSpPr>
-          <p:nvPr/>
-        </p:nvSpPr>
-        <p:spPr>
-          <a:xfrm>
-            <a:off x="750242" y="6092880"/>
-            <a:ext cx="3246992" cy="617260"/>
-          </a:xfrm>
-          <a:prstGeom prst="rect">
-            <a:avLst/>
-          </a:prstGeom>
-        </p:spPr>
-        <p:txBody>
-          <a:bodyPr vert="horz" lIns="91440" tIns="45720" rIns="91440" bIns="45720" rtlCol="0" anchor="ctr">
-            <a:normAutofit/>
-          </a:bodyPr>
-          <a:lstStyle>
-            <a:defPPr>
-              <a:defRPr lang="en-US"/>
-            </a:defPPr>
-            <a:lvl1pPr marL="0" algn="ctr" defTabSz="914400" rtl="0" eaLnBrk="1" latinLnBrk="0" hangingPunct="1">
-              <a:defRPr sz="1200" kern="1200">
-                <a:solidFill>
-                  <a:schemeClr val="tx1">
-                    <a:tint val="75000"/>
-                  </a:schemeClr>
-                </a:solidFill>
-                <a:latin typeface="+mn-lt"/>
-                <a:ea typeface="+mn-ea"/>
-                <a:cs typeface="+mn-cs"/>
-              </a:defRPr>
-            </a:lvl1pPr>
-            <a:lvl2pPr marL="457200" algn="l" defTabSz="914400" rtl="0" eaLnBrk="1" latinLnBrk="0" hangingPunct="1">
-              <a:defRPr sz="1800" kern="1200">
-                <a:solidFill>
-                  <a:schemeClr val="tx1"/>
-                </a:solidFill>
-                <a:latin typeface="+mn-lt"/>
-                <a:ea typeface="+mn-ea"/>
-                <a:cs typeface="+mn-cs"/>
-              </a:defRPr>
-            </a:lvl2pPr>
-            <a:lvl3pPr marL="914400" algn="l" defTabSz="914400" rtl="0" eaLnBrk="1" latinLnBrk="0" hangingPunct="1">
-              <a:defRPr sz="1800" kern="1200">
-                <a:solidFill>
-                  <a:schemeClr val="tx1"/>
-                </a:solidFill>
-                <a:latin typeface="+mn-lt"/>
-                <a:ea typeface="+mn-ea"/>
-                <a:cs typeface="+mn-cs"/>
-              </a:defRPr>
-            </a:lvl3pPr>
-            <a:lvl4pPr marL="1371600" algn="l" defTabSz="914400" rtl="0" eaLnBrk="1" latinLnBrk="0" hangingPunct="1">
-              <a:defRPr sz="1800" kern="1200">
-                <a:solidFill>
-                  <a:schemeClr val="tx1"/>
-                </a:solidFill>
-                <a:latin typeface="+mn-lt"/>
-                <a:ea typeface="+mn-ea"/>
-                <a:cs typeface="+mn-cs"/>
-              </a:defRPr>
-            </a:lvl4pPr>
-            <a:lvl5pPr marL="1828800" algn="l" defTabSz="914400" rtl="0" eaLnBrk="1" latinLnBrk="0" hangingPunct="1">
-              <a:defRPr sz="1800" kern="1200">
-                <a:solidFill>
-                  <a:schemeClr val="tx1"/>
-                </a:solidFill>
-                <a:latin typeface="+mn-lt"/>
-                <a:ea typeface="+mn-ea"/>
-                <a:cs typeface="+mn-cs"/>
-              </a:defRPr>
-            </a:lvl5pPr>
-            <a:lvl6pPr marL="2286000" algn="l" defTabSz="914400" rtl="0" eaLnBrk="1" latinLnBrk="0" hangingPunct="1">
-              <a:defRPr sz="1800" kern="1200">
-                <a:solidFill>
-                  <a:schemeClr val="tx1"/>
-                </a:solidFill>
-                <a:latin typeface="+mn-lt"/>
-                <a:ea typeface="+mn-ea"/>
-                <a:cs typeface="+mn-cs"/>
-              </a:defRPr>
-            </a:lvl6pPr>
-            <a:lvl7pPr marL="2743200" algn="l" defTabSz="914400" rtl="0" eaLnBrk="1" latinLnBrk="0" hangingPunct="1">
-              <a:defRPr sz="1800" kern="1200">
-                <a:solidFill>
-                  <a:schemeClr val="tx1"/>
-                </a:solidFill>
-                <a:latin typeface="+mn-lt"/>
-                <a:ea typeface="+mn-ea"/>
-                <a:cs typeface="+mn-cs"/>
-              </a:defRPr>
-            </a:lvl7pPr>
-            <a:lvl8pPr marL="3200400" algn="l" defTabSz="914400" rtl="0" eaLnBrk="1" latinLnBrk="0" hangingPunct="1">
-              <a:defRPr sz="1800" kern="1200">
-                <a:solidFill>
-                  <a:schemeClr val="tx1"/>
-                </a:solidFill>
-                <a:latin typeface="+mn-lt"/>
-                <a:ea typeface="+mn-ea"/>
-                <a:cs typeface="+mn-cs"/>
-              </a:defRPr>
-            </a:lvl8pPr>
-            <a:lvl9pPr marL="3657600" algn="l" defTabSz="914400" rtl="0" eaLnBrk="1" latinLnBrk="0" hangingPunct="1">
-              <a:defRPr sz="1800" kern="1200">
-                <a:solidFill>
-                  <a:schemeClr val="tx1"/>
-                </a:solidFill>
-                <a:latin typeface="+mn-lt"/>
-                <a:ea typeface="+mn-ea"/>
-                <a:cs typeface="+mn-cs"/>
-              </a:defRPr>
-            </a:lvl9pPr>
-          </a:lstStyle>
-          <a:p>
-            <a:pPr algn="l">
-              <a:spcAft>
-                <a:spcPts val="600"/>
-              </a:spcAft>
-            </a:pPr>
-            <a:r>
-              <a:rPr lang="it-IT" sz="1100">
-                <a:solidFill>
-                  <a:schemeClr val="tx1"/>
-                </a:solidFill>
-              </a:rPr>
-              <a:t>A. Le Caldare, E. Sassu, E. Scarselli</a:t>
-            </a:r>
-            <a:endParaRPr lang="en-GB" sz="1100" dirty="0">
-              <a:solidFill>
-                <a:schemeClr val="tx1"/>
-              </a:solidFill>
-            </a:endParaRPr>
-          </a:p>
-        </p:txBody>
-      </p:sp>
-      <p:sp>
-        <p:nvSpPr>
-          <p:cNvPr id="27" name="Segnaposto numero diapositiva 4">
-            <a:extLst>
-              <a:ext uri="{FF2B5EF4-FFF2-40B4-BE49-F238E27FC236}">
-                <a16:creationId xmlns:a16="http://schemas.microsoft.com/office/drawing/2014/main" id="{144FA246-62DE-4D8A-B3A7-E14DD88F9E99}"/>
-              </a:ext>
-            </a:extLst>
-          </p:cNvPr>
-          <p:cNvSpPr txBox="1">
-            <a:spLocks/>
-          </p:cNvSpPr>
-          <p:nvPr/>
-        </p:nvSpPr>
-        <p:spPr>
-          <a:xfrm>
-            <a:off x="11000232" y="6108192"/>
-            <a:ext cx="548640" cy="548640"/>
-          </a:xfrm>
-          <a:prstGeom prst="ellipse">
-            <a:avLst/>
-          </a:prstGeom>
-          <a:solidFill>
-            <a:srgbClr val="368B50"/>
-          </a:solidFill>
-        </p:spPr>
-        <p:txBody>
-          <a:bodyPr vert="horz" lIns="91440" tIns="45720" rIns="91440" bIns="45720" rtlCol="0" anchor="ctr">
-            <a:normAutofit/>
-          </a:bodyPr>
-          <a:lstStyle>
-            <a:defPPr>
-              <a:defRPr lang="en-US"/>
-            </a:defPPr>
-            <a:lvl1pPr marL="0" algn="r" defTabSz="914400" rtl="0" eaLnBrk="1" latinLnBrk="0" hangingPunct="1">
-              <a:defRPr sz="1200" kern="1200">
-                <a:solidFill>
-                  <a:schemeClr val="tx1">
-                    <a:tint val="75000"/>
-                  </a:schemeClr>
-                </a:solidFill>
-                <a:latin typeface="+mn-lt"/>
-                <a:ea typeface="+mn-ea"/>
-                <a:cs typeface="+mn-cs"/>
-              </a:defRPr>
-            </a:lvl1pPr>
-            <a:lvl2pPr marL="457200" algn="l" defTabSz="914400" rtl="0" eaLnBrk="1" latinLnBrk="0" hangingPunct="1">
-              <a:defRPr sz="1800" kern="1200">
-                <a:solidFill>
-                  <a:schemeClr val="tx1"/>
-                </a:solidFill>
-                <a:latin typeface="+mn-lt"/>
-                <a:ea typeface="+mn-ea"/>
-                <a:cs typeface="+mn-cs"/>
-              </a:defRPr>
-            </a:lvl2pPr>
-            <a:lvl3pPr marL="914400" algn="l" defTabSz="914400" rtl="0" eaLnBrk="1" latinLnBrk="0" hangingPunct="1">
-              <a:defRPr sz="1800" kern="1200">
-                <a:solidFill>
-                  <a:schemeClr val="tx1"/>
-                </a:solidFill>
-                <a:latin typeface="+mn-lt"/>
-                <a:ea typeface="+mn-ea"/>
-                <a:cs typeface="+mn-cs"/>
-              </a:defRPr>
-            </a:lvl3pPr>
-            <a:lvl4pPr marL="1371600" algn="l" defTabSz="914400" rtl="0" eaLnBrk="1" latinLnBrk="0" hangingPunct="1">
-              <a:defRPr sz="1800" kern="1200">
-                <a:solidFill>
-                  <a:schemeClr val="tx1"/>
-                </a:solidFill>
-                <a:latin typeface="+mn-lt"/>
-                <a:ea typeface="+mn-ea"/>
-                <a:cs typeface="+mn-cs"/>
-              </a:defRPr>
-            </a:lvl4pPr>
-            <a:lvl5pPr marL="1828800" algn="l" defTabSz="914400" rtl="0" eaLnBrk="1" latinLnBrk="0" hangingPunct="1">
-              <a:defRPr sz="1800" kern="1200">
-                <a:solidFill>
-                  <a:schemeClr val="tx1"/>
-                </a:solidFill>
-                <a:latin typeface="+mn-lt"/>
-                <a:ea typeface="+mn-ea"/>
-                <a:cs typeface="+mn-cs"/>
-              </a:defRPr>
-            </a:lvl5pPr>
-            <a:lvl6pPr marL="2286000" algn="l" defTabSz="914400" rtl="0" eaLnBrk="1" latinLnBrk="0" hangingPunct="1">
-              <a:defRPr sz="1800" kern="1200">
-                <a:solidFill>
-                  <a:schemeClr val="tx1"/>
-                </a:solidFill>
-                <a:latin typeface="+mn-lt"/>
-                <a:ea typeface="+mn-ea"/>
-                <a:cs typeface="+mn-cs"/>
-              </a:defRPr>
-            </a:lvl6pPr>
-            <a:lvl7pPr marL="2743200" algn="l" defTabSz="914400" rtl="0" eaLnBrk="1" latinLnBrk="0" hangingPunct="1">
-              <a:defRPr sz="1800" kern="1200">
-                <a:solidFill>
-                  <a:schemeClr val="tx1"/>
-                </a:solidFill>
-                <a:latin typeface="+mn-lt"/>
-                <a:ea typeface="+mn-ea"/>
-                <a:cs typeface="+mn-cs"/>
-              </a:defRPr>
-            </a:lvl7pPr>
-            <a:lvl8pPr marL="3200400" algn="l" defTabSz="914400" rtl="0" eaLnBrk="1" latinLnBrk="0" hangingPunct="1">
-              <a:defRPr sz="1800" kern="1200">
-                <a:solidFill>
-                  <a:schemeClr val="tx1"/>
-                </a:solidFill>
-                <a:latin typeface="+mn-lt"/>
-                <a:ea typeface="+mn-ea"/>
-                <a:cs typeface="+mn-cs"/>
-              </a:defRPr>
-            </a:lvl8pPr>
-            <a:lvl9pPr marL="3657600" algn="l" defTabSz="914400" rtl="0" eaLnBrk="1" latinLnBrk="0" hangingPunct="1">
-              <a:defRPr sz="1800" kern="1200">
-                <a:solidFill>
-                  <a:schemeClr val="tx1"/>
-                </a:solidFill>
-                <a:latin typeface="+mn-lt"/>
-                <a:ea typeface="+mn-ea"/>
-                <a:cs typeface="+mn-cs"/>
-              </a:defRPr>
-            </a:lvl9pPr>
-          </a:lstStyle>
-          <a:p>
-            <a:pPr algn="ctr">
-              <a:spcAft>
-                <a:spcPts val="600"/>
-              </a:spcAft>
-            </a:pPr>
-            <a:fld id="{5BB7E168-F539-4513-AD44-F276B24E7DDF}" type="slidenum">
-              <a:rPr lang="en-GB" sz="1500" smtClean="0">
-                <a:solidFill>
-                  <a:srgbClr val="FFFFFF"/>
-                </a:solidFill>
-              </a:rPr>
-              <a:pPr algn="ctr">
-                <a:spcAft>
-                  <a:spcPts val="600"/>
-                </a:spcAft>
-              </a:pPr>
-              <a:t>16</a:t>
-            </a:fld>
-            <a:endParaRPr lang="en-GB" sz="1500">
-              <a:solidFill>
-                <a:srgbClr val="FFFFFF"/>
-              </a:solidFill>
-            </a:endParaRPr>
-          </a:p>
-        </p:txBody>
-      </p:sp>
       <p:pic>
         <p:nvPicPr>
           <p:cNvPr id="3" name="Immagine 2">
@@ -10050,6 +9590,64 @@
           </a:prstGeom>
         </p:spPr>
       </p:pic>
+      <p:sp>
+        <p:nvSpPr>
+          <p:cNvPr id="2" name="Segnaposto piè di pagina 1">
+            <a:extLst>
+              <a:ext uri="{FF2B5EF4-FFF2-40B4-BE49-F238E27FC236}">
+                <a16:creationId xmlns:a16="http://schemas.microsoft.com/office/drawing/2014/main" id="{FFE3D1F7-CDD2-416F-B6D0-A15B3CB03416}"/>
+              </a:ext>
+            </a:extLst>
+          </p:cNvPr>
+          <p:cNvSpPr>
+            <a:spLocks noGrp="1"/>
+          </p:cNvSpPr>
+          <p:nvPr>
+            <p:ph type="ftr" sz="quarter" idx="11"/>
+          </p:nvPr>
+        </p:nvSpPr>
+        <p:spPr/>
+        <p:txBody>
+          <a:bodyPr/>
+          <a:lstStyle/>
+          <a:p>
+            <a:r>
+              <a:rPr lang="it-IT"/>
+              <a:t>A. Le Caldare, E. Sassu, E. Scarselli</a:t>
+            </a:r>
+            <a:endParaRPr lang="en-GB"/>
+          </a:p>
+        </p:txBody>
+      </p:sp>
+      <p:sp>
+        <p:nvSpPr>
+          <p:cNvPr id="4" name="Segnaposto numero diapositiva 3">
+            <a:extLst>
+              <a:ext uri="{FF2B5EF4-FFF2-40B4-BE49-F238E27FC236}">
+                <a16:creationId xmlns:a16="http://schemas.microsoft.com/office/drawing/2014/main" id="{E81E109F-DE96-4502-A81D-FDB7F4786CCA}"/>
+              </a:ext>
+            </a:extLst>
+          </p:cNvPr>
+          <p:cNvSpPr>
+            <a:spLocks noGrp="1"/>
+          </p:cNvSpPr>
+          <p:nvPr>
+            <p:ph type="sldNum" sz="quarter" idx="12"/>
+          </p:nvPr>
+        </p:nvSpPr>
+        <p:spPr/>
+        <p:txBody>
+          <a:bodyPr/>
+          <a:lstStyle/>
+          <a:p>
+            <a:r>
+              <a:rPr lang="it-IT" dirty="0"/>
+              <a:t>12</a:t>
+            </a:r>
+            <a:endParaRPr lang="en-GB" dirty="0"/>
+          </a:p>
+        </p:txBody>
+      </p:sp>
     </p:spTree>
     <p:extLst>
       <p:ext uri="{BB962C8B-B14F-4D97-AF65-F5344CB8AC3E}">
@@ -10772,301 +10370,74 @@
       </p:sp>
       <p:sp>
         <p:nvSpPr>
-          <p:cNvPr id="26" name="Segnaposto piè di pagina 3">
-            <a:extLst>
-              <a:ext uri="{FF2B5EF4-FFF2-40B4-BE49-F238E27FC236}">
-                <a16:creationId xmlns:a16="http://schemas.microsoft.com/office/drawing/2014/main" id="{F5919EAC-275A-46C3-86EC-C350ABC98A16}"/>
-              </a:ext>
-            </a:extLst>
-          </p:cNvPr>
-          <p:cNvSpPr txBox="1">
-            <a:spLocks/>
-          </p:cNvSpPr>
-          <p:nvPr/>
-        </p:nvSpPr>
-        <p:spPr>
-          <a:xfrm>
-            <a:off x="750242" y="6092880"/>
-            <a:ext cx="3246992" cy="617260"/>
-          </a:xfrm>
-          <a:prstGeom prst="rect">
-            <a:avLst/>
-          </a:prstGeom>
-        </p:spPr>
-        <p:txBody>
-          <a:bodyPr vert="horz" lIns="91440" tIns="45720" rIns="91440" bIns="45720" rtlCol="0" anchor="ctr">
-            <a:normAutofit/>
-          </a:bodyPr>
-          <a:lstStyle>
-            <a:defPPr>
-              <a:defRPr lang="en-US"/>
-            </a:defPPr>
-            <a:lvl1pPr marL="0" algn="ctr" defTabSz="914400" rtl="0" eaLnBrk="1" latinLnBrk="0" hangingPunct="1">
-              <a:defRPr sz="1200" kern="1200">
-                <a:solidFill>
-                  <a:schemeClr val="tx1">
-                    <a:tint val="75000"/>
-                  </a:schemeClr>
-                </a:solidFill>
-                <a:latin typeface="+mn-lt"/>
-                <a:ea typeface="+mn-ea"/>
-                <a:cs typeface="+mn-cs"/>
-              </a:defRPr>
-            </a:lvl1pPr>
-            <a:lvl2pPr marL="457200" algn="l" defTabSz="914400" rtl="0" eaLnBrk="1" latinLnBrk="0" hangingPunct="1">
-              <a:defRPr sz="1800" kern="1200">
-                <a:solidFill>
-                  <a:schemeClr val="tx1"/>
-                </a:solidFill>
-                <a:latin typeface="+mn-lt"/>
-                <a:ea typeface="+mn-ea"/>
-                <a:cs typeface="+mn-cs"/>
-              </a:defRPr>
-            </a:lvl2pPr>
-            <a:lvl3pPr marL="914400" algn="l" defTabSz="914400" rtl="0" eaLnBrk="1" latinLnBrk="0" hangingPunct="1">
-              <a:defRPr sz="1800" kern="1200">
-                <a:solidFill>
-                  <a:schemeClr val="tx1"/>
-                </a:solidFill>
-                <a:latin typeface="+mn-lt"/>
-                <a:ea typeface="+mn-ea"/>
-                <a:cs typeface="+mn-cs"/>
-              </a:defRPr>
-            </a:lvl3pPr>
-            <a:lvl4pPr marL="1371600" algn="l" defTabSz="914400" rtl="0" eaLnBrk="1" latinLnBrk="0" hangingPunct="1">
-              <a:defRPr sz="1800" kern="1200">
-                <a:solidFill>
-                  <a:schemeClr val="tx1"/>
-                </a:solidFill>
-                <a:latin typeface="+mn-lt"/>
-                <a:ea typeface="+mn-ea"/>
-                <a:cs typeface="+mn-cs"/>
-              </a:defRPr>
-            </a:lvl4pPr>
-            <a:lvl5pPr marL="1828800" algn="l" defTabSz="914400" rtl="0" eaLnBrk="1" latinLnBrk="0" hangingPunct="1">
-              <a:defRPr sz="1800" kern="1200">
-                <a:solidFill>
-                  <a:schemeClr val="tx1"/>
-                </a:solidFill>
-                <a:latin typeface="+mn-lt"/>
-                <a:ea typeface="+mn-ea"/>
-                <a:cs typeface="+mn-cs"/>
-              </a:defRPr>
-            </a:lvl5pPr>
-            <a:lvl6pPr marL="2286000" algn="l" defTabSz="914400" rtl="0" eaLnBrk="1" latinLnBrk="0" hangingPunct="1">
-              <a:defRPr sz="1800" kern="1200">
-                <a:solidFill>
-                  <a:schemeClr val="tx1"/>
-                </a:solidFill>
-                <a:latin typeface="+mn-lt"/>
-                <a:ea typeface="+mn-ea"/>
-                <a:cs typeface="+mn-cs"/>
-              </a:defRPr>
-            </a:lvl6pPr>
-            <a:lvl7pPr marL="2743200" algn="l" defTabSz="914400" rtl="0" eaLnBrk="1" latinLnBrk="0" hangingPunct="1">
-              <a:defRPr sz="1800" kern="1200">
-                <a:solidFill>
-                  <a:schemeClr val="tx1"/>
-                </a:solidFill>
-                <a:latin typeface="+mn-lt"/>
-                <a:ea typeface="+mn-ea"/>
-                <a:cs typeface="+mn-cs"/>
-              </a:defRPr>
-            </a:lvl7pPr>
-            <a:lvl8pPr marL="3200400" algn="l" defTabSz="914400" rtl="0" eaLnBrk="1" latinLnBrk="0" hangingPunct="1">
-              <a:defRPr sz="1800" kern="1200">
-                <a:solidFill>
-                  <a:schemeClr val="tx1"/>
-                </a:solidFill>
-                <a:latin typeface="+mn-lt"/>
-                <a:ea typeface="+mn-ea"/>
-                <a:cs typeface="+mn-cs"/>
-              </a:defRPr>
-            </a:lvl8pPr>
-            <a:lvl9pPr marL="3657600" algn="l" defTabSz="914400" rtl="0" eaLnBrk="1" latinLnBrk="0" hangingPunct="1">
-              <a:defRPr sz="1800" kern="1200">
-                <a:solidFill>
-                  <a:schemeClr val="tx1"/>
-                </a:solidFill>
-                <a:latin typeface="+mn-lt"/>
-                <a:ea typeface="+mn-ea"/>
-                <a:cs typeface="+mn-cs"/>
-              </a:defRPr>
-            </a:lvl9pPr>
-          </a:lstStyle>
-          <a:p>
-            <a:pPr algn="l">
-              <a:spcAft>
-                <a:spcPts val="600"/>
-              </a:spcAft>
-            </a:pPr>
-            <a:r>
-              <a:rPr lang="it-IT" sz="1100">
-                <a:solidFill>
-                  <a:schemeClr val="tx1"/>
-                </a:solidFill>
-              </a:rPr>
-              <a:t>A. Le Caldare, E. Sassu, E. Scarselli</a:t>
-            </a:r>
-            <a:endParaRPr lang="en-GB" sz="1100" dirty="0">
-              <a:solidFill>
-                <a:schemeClr val="tx1"/>
-              </a:solidFill>
-            </a:endParaRPr>
-          </a:p>
-        </p:txBody>
-      </p:sp>
-      <p:sp>
-        <p:nvSpPr>
-          <p:cNvPr id="27" name="Segnaposto numero diapositiva 4">
-            <a:extLst>
-              <a:ext uri="{FF2B5EF4-FFF2-40B4-BE49-F238E27FC236}">
-                <a16:creationId xmlns:a16="http://schemas.microsoft.com/office/drawing/2014/main" id="{144FA246-62DE-4D8A-B3A7-E14DD88F9E99}"/>
-              </a:ext>
-            </a:extLst>
-          </p:cNvPr>
-          <p:cNvSpPr txBox="1">
-            <a:spLocks/>
-          </p:cNvSpPr>
-          <p:nvPr/>
-        </p:nvSpPr>
-        <p:spPr>
-          <a:xfrm>
-            <a:off x="11000232" y="6108192"/>
-            <a:ext cx="548640" cy="548640"/>
-          </a:xfrm>
-          <a:prstGeom prst="ellipse">
-            <a:avLst/>
-          </a:prstGeom>
-          <a:solidFill>
-            <a:srgbClr val="368B50"/>
-          </a:solidFill>
-        </p:spPr>
-        <p:txBody>
-          <a:bodyPr vert="horz" lIns="91440" tIns="45720" rIns="91440" bIns="45720" rtlCol="0" anchor="ctr">
-            <a:normAutofit/>
-          </a:bodyPr>
-          <a:lstStyle>
-            <a:defPPr>
-              <a:defRPr lang="en-US"/>
-            </a:defPPr>
-            <a:lvl1pPr marL="0" algn="r" defTabSz="914400" rtl="0" eaLnBrk="1" latinLnBrk="0" hangingPunct="1">
-              <a:defRPr sz="1200" kern="1200">
-                <a:solidFill>
-                  <a:schemeClr val="tx1">
-                    <a:tint val="75000"/>
-                  </a:schemeClr>
-                </a:solidFill>
-                <a:latin typeface="+mn-lt"/>
-                <a:ea typeface="+mn-ea"/>
-                <a:cs typeface="+mn-cs"/>
-              </a:defRPr>
-            </a:lvl1pPr>
-            <a:lvl2pPr marL="457200" algn="l" defTabSz="914400" rtl="0" eaLnBrk="1" latinLnBrk="0" hangingPunct="1">
-              <a:defRPr sz="1800" kern="1200">
-                <a:solidFill>
-                  <a:schemeClr val="tx1"/>
-                </a:solidFill>
-                <a:latin typeface="+mn-lt"/>
-                <a:ea typeface="+mn-ea"/>
-                <a:cs typeface="+mn-cs"/>
-              </a:defRPr>
-            </a:lvl2pPr>
-            <a:lvl3pPr marL="914400" algn="l" defTabSz="914400" rtl="0" eaLnBrk="1" latinLnBrk="0" hangingPunct="1">
-              <a:defRPr sz="1800" kern="1200">
-                <a:solidFill>
-                  <a:schemeClr val="tx1"/>
-                </a:solidFill>
-                <a:latin typeface="+mn-lt"/>
-                <a:ea typeface="+mn-ea"/>
-                <a:cs typeface="+mn-cs"/>
-              </a:defRPr>
-            </a:lvl3pPr>
-            <a:lvl4pPr marL="1371600" algn="l" defTabSz="914400" rtl="0" eaLnBrk="1" latinLnBrk="0" hangingPunct="1">
-              <a:defRPr sz="1800" kern="1200">
-                <a:solidFill>
-                  <a:schemeClr val="tx1"/>
-                </a:solidFill>
-                <a:latin typeface="+mn-lt"/>
-                <a:ea typeface="+mn-ea"/>
-                <a:cs typeface="+mn-cs"/>
-              </a:defRPr>
-            </a:lvl4pPr>
-            <a:lvl5pPr marL="1828800" algn="l" defTabSz="914400" rtl="0" eaLnBrk="1" latinLnBrk="0" hangingPunct="1">
-              <a:defRPr sz="1800" kern="1200">
-                <a:solidFill>
-                  <a:schemeClr val="tx1"/>
-                </a:solidFill>
-                <a:latin typeface="+mn-lt"/>
-                <a:ea typeface="+mn-ea"/>
-                <a:cs typeface="+mn-cs"/>
-              </a:defRPr>
-            </a:lvl5pPr>
-            <a:lvl6pPr marL="2286000" algn="l" defTabSz="914400" rtl="0" eaLnBrk="1" latinLnBrk="0" hangingPunct="1">
-              <a:defRPr sz="1800" kern="1200">
-                <a:solidFill>
-                  <a:schemeClr val="tx1"/>
-                </a:solidFill>
-                <a:latin typeface="+mn-lt"/>
-                <a:ea typeface="+mn-ea"/>
-                <a:cs typeface="+mn-cs"/>
-              </a:defRPr>
-            </a:lvl6pPr>
-            <a:lvl7pPr marL="2743200" algn="l" defTabSz="914400" rtl="0" eaLnBrk="1" latinLnBrk="0" hangingPunct="1">
-              <a:defRPr sz="1800" kern="1200">
-                <a:solidFill>
-                  <a:schemeClr val="tx1"/>
-                </a:solidFill>
-                <a:latin typeface="+mn-lt"/>
-                <a:ea typeface="+mn-ea"/>
-                <a:cs typeface="+mn-cs"/>
-              </a:defRPr>
-            </a:lvl7pPr>
-            <a:lvl8pPr marL="3200400" algn="l" defTabSz="914400" rtl="0" eaLnBrk="1" latinLnBrk="0" hangingPunct="1">
-              <a:defRPr sz="1800" kern="1200">
-                <a:solidFill>
-                  <a:schemeClr val="tx1"/>
-                </a:solidFill>
-                <a:latin typeface="+mn-lt"/>
-                <a:ea typeface="+mn-ea"/>
-                <a:cs typeface="+mn-cs"/>
-              </a:defRPr>
-            </a:lvl8pPr>
-            <a:lvl9pPr marL="3657600" algn="l" defTabSz="914400" rtl="0" eaLnBrk="1" latinLnBrk="0" hangingPunct="1">
-              <a:defRPr sz="1800" kern="1200">
-                <a:solidFill>
-                  <a:schemeClr val="tx1"/>
-                </a:solidFill>
-                <a:latin typeface="+mn-lt"/>
-                <a:ea typeface="+mn-ea"/>
-                <a:cs typeface="+mn-cs"/>
-              </a:defRPr>
-            </a:lvl9pPr>
-          </a:lstStyle>
-          <a:p>
-            <a:pPr algn="ctr">
-              <a:spcAft>
-                <a:spcPts val="600"/>
-              </a:spcAft>
-            </a:pPr>
-            <a:fld id="{5BB7E168-F539-4513-AD44-F276B24E7DDF}" type="slidenum">
-              <a:rPr lang="en-GB" sz="1500" smtClean="0">
-                <a:solidFill>
-                  <a:srgbClr val="FFFFFF"/>
-                </a:solidFill>
-              </a:rPr>
-              <a:pPr algn="ctr">
-                <a:spcAft>
-                  <a:spcPts val="600"/>
-                </a:spcAft>
-              </a:pPr>
-              <a:t>17</a:t>
-            </a:fld>
-            <a:endParaRPr lang="en-GB" sz="1500">
-              <a:solidFill>
-                <a:srgbClr val="FFFFFF"/>
-              </a:solidFill>
-            </a:endParaRPr>
+          <p:cNvPr id="2" name="Segnaposto piè di pagina 1">
+            <a:extLst>
+              <a:ext uri="{FF2B5EF4-FFF2-40B4-BE49-F238E27FC236}">
+                <a16:creationId xmlns:a16="http://schemas.microsoft.com/office/drawing/2014/main" id="{0F145B13-D746-4F30-9245-505AEB433AE9}"/>
+              </a:ext>
+            </a:extLst>
+          </p:cNvPr>
+          <p:cNvSpPr>
+            <a:spLocks noGrp="1"/>
+          </p:cNvSpPr>
+          <p:nvPr>
+            <p:ph type="ftr" sz="quarter" idx="11"/>
+          </p:nvPr>
+        </p:nvSpPr>
+        <p:spPr/>
+        <p:txBody>
+          <a:bodyPr/>
+          <a:lstStyle/>
+          <a:p>
+            <a:r>
+              <a:rPr lang="it-IT" dirty="0"/>
+              <a:t>A. Le </a:t>
+            </a:r>
+            <a:r>
+              <a:rPr lang="it-IT" dirty="0" err="1"/>
+              <a:t>Caldare</a:t>
+            </a:r>
+            <a:r>
+              <a:rPr lang="it-IT" dirty="0"/>
+              <a:t>, E. </a:t>
+            </a:r>
+            <a:r>
+              <a:rPr lang="it-IT" dirty="0" err="1"/>
+              <a:t>Sassu</a:t>
+            </a:r>
+            <a:r>
+              <a:rPr lang="it-IT" dirty="0"/>
+              <a:t>, E. Scarselli</a:t>
+            </a:r>
+            <a:endParaRPr lang="en-GB" dirty="0"/>
+          </a:p>
+        </p:txBody>
+      </p:sp>
+      <p:sp>
+        <p:nvSpPr>
+          <p:cNvPr id="3" name="Segnaposto numero diapositiva 2">
+            <a:extLst>
+              <a:ext uri="{FF2B5EF4-FFF2-40B4-BE49-F238E27FC236}">
+                <a16:creationId xmlns:a16="http://schemas.microsoft.com/office/drawing/2014/main" id="{B9EF7013-7740-4319-974B-8A9B1818E30C}"/>
+              </a:ext>
+            </a:extLst>
+          </p:cNvPr>
+          <p:cNvSpPr>
+            <a:spLocks noGrp="1"/>
+          </p:cNvSpPr>
+          <p:nvPr>
+            <p:ph type="sldNum" sz="quarter" idx="12"/>
+          </p:nvPr>
+        </p:nvSpPr>
+        <p:spPr/>
+        <p:txBody>
+          <a:bodyPr/>
+          <a:lstStyle/>
+          <a:p>
+            <a:r>
+              <a:rPr lang="en-GB" dirty="0"/>
+              <a:t>13</a:t>
+            </a:r>
           </a:p>
         </p:txBody>
       </p:sp>
@@ -13202,7 +12573,13 @@
                     <a:lumMod val="75000"/>
                   </a:schemeClr>
                 </a:solidFill>
-                <a:hlinkClick r:id="rId4"/>
+                <a:hlinkClick r:id="rId4">
+                  <a:extLst>
+                    <a:ext uri="{A12FA001-AC4F-418D-AE19-62706E023703}">
+                      <ahyp:hlinkClr xmlns:ahyp="http://schemas.microsoft.com/office/drawing/2018/hyperlinkcolor" val="tx"/>
+                    </a:ext>
+                  </a:extLst>
+                </a:hlinkClick>
               </a:rPr>
               <a:t>[2]</a:t>
             </a:r>
@@ -13534,10 +12911,15 @@
             <p:ph idx="1"/>
           </p:nvPr>
         </p:nvSpPr>
-        <p:spPr/>
+        <p:spPr>
+          <a:xfrm>
+            <a:off x="838200" y="1825625"/>
+            <a:ext cx="10515600" cy="4351338"/>
+          </a:xfrm>
+        </p:spPr>
         <p:txBody>
           <a:bodyPr>
-            <a:normAutofit lnSpcReduction="10000"/>
+            <a:normAutofit fontScale="92500"/>
           </a:bodyPr>
           <a:lstStyle/>
           <a:p>
@@ -13549,58 +12931,7 @@
                   </a:schemeClr>
                 </a:solidFill>
               </a:rPr>
-              <a:t>Execution order of floodlight modules [1].</a:t>
-            </a:r>
-          </a:p>
-          <a:p>
-            <a:r>
-              <a:rPr lang="en-GB" sz="3200" b="1" noProof="0" dirty="0"/>
-              <a:t>The normal rule (</a:t>
-            </a:r>
-            <a:r>
-              <a:rPr lang="en-GB" sz="3200" b="1" noProof="0" dirty="0" err="1"/>
-              <a:t>action.normal</a:t>
-            </a:r>
-            <a:r>
-              <a:rPr lang="en-GB" sz="3200" b="1" noProof="0" dirty="0"/>
-              <a:t>) does not work for non hybrid switches.</a:t>
-            </a:r>
-          </a:p>
-          <a:p>
-            <a:r>
-              <a:rPr lang="en-GB" noProof="0" dirty="0">
-                <a:solidFill>
-                  <a:schemeClr val="bg1">
-                    <a:lumMod val="75000"/>
-                  </a:schemeClr>
-                </a:solidFill>
-              </a:rPr>
-              <a:t>Learning switch: </a:t>
-            </a:r>
-          </a:p>
-          <a:p>
-            <a:pPr lvl="1"/>
-            <a:r>
-              <a:rPr lang="en-GB" noProof="0" dirty="0">
-                <a:solidFill>
-                  <a:schemeClr val="bg1">
-                    <a:lumMod val="75000"/>
-                  </a:schemeClr>
-                </a:solidFill>
-              </a:rPr>
-              <a:t>Add interface to retrieve MAC addresses from the learning switch controller</a:t>
-            </a:r>
-          </a:p>
-          <a:p>
-            <a:r>
-              <a:rPr lang="en-GB" noProof="0" dirty="0">
-                <a:solidFill>
-                  <a:schemeClr val="bg1">
-                    <a:lumMod val="75000"/>
-                  </a:schemeClr>
-                </a:solidFill>
-              </a:rPr>
-              <a:t>Deleting rules are specified </a:t>
+              <a:t>Execution order of floodlight modules </a:t>
             </a:r>
             <a:r>
               <a:rPr lang="en-GB" noProof="0" dirty="0">
@@ -13617,54 +12948,89 @@
                   </a:extLst>
                 </a:hlinkClick>
               </a:rPr>
-              <a:t>here</a:t>
-            </a:r>
-            <a:r>
-              <a:rPr lang="en-GB" noProof="0" dirty="0">
+              <a:t>[</a:t>
+            </a:r>
+            <a:r>
+              <a:rPr lang="en-GB" dirty="0">
                 <a:solidFill>
                   <a:schemeClr val="bg1">
                     <a:lumMod val="75000"/>
                   </a:schemeClr>
                 </a:solidFill>
+                <a:hlinkClick r:id="rId3">
+                  <a:extLst>
+                    <a:ext uri="{A12FA001-AC4F-418D-AE19-62706E023703}">
+                      <ahyp:hlinkClr xmlns:ahyp="http://schemas.microsoft.com/office/drawing/2018/hyperlinkcolor" val="tx"/>
+                    </a:ext>
+                  </a:extLst>
+                </a:hlinkClick>
               </a:rPr>
-              <a:t>. </a:t>
-            </a:r>
-          </a:p>
-          <a:p>
-            <a:pPr lvl="1"/>
-            <a:r>
-              <a:rPr lang="en-GB" noProof="0" dirty="0" err="1">
+              <a:t>1]</a:t>
+            </a:r>
+            <a:endParaRPr lang="en-GB" noProof="0" dirty="0">
+              <a:solidFill>
+                <a:schemeClr val="bg1">
+                  <a:lumMod val="75000"/>
+                </a:schemeClr>
+              </a:solidFill>
+            </a:endParaRPr>
+          </a:p>
+          <a:p>
+            <a:r>
+              <a:rPr lang="en-GB" sz="3200" b="1" noProof="0" dirty="0"/>
+              <a:t>The normal rule (</a:t>
+            </a:r>
+            <a:r>
+              <a:rPr lang="en-GB" sz="3200" b="1" noProof="0" dirty="0" err="1"/>
+              <a:t>action.normal</a:t>
+            </a:r>
+            <a:r>
+              <a:rPr lang="en-GB" sz="3200" b="1" noProof="0" dirty="0"/>
+              <a:t>) does not work for non hybrid switches</a:t>
+            </a:r>
+            <a:r>
+              <a:rPr lang="en-GB" b="1" noProof="0" dirty="0">
                 <a:solidFill>
                   <a:schemeClr val="bg1">
                     <a:lumMod val="75000"/>
                   </a:schemeClr>
                 </a:solidFill>
               </a:rPr>
-              <a:t>OFFlowDelete</a:t>
-            </a:r>
-            <a:r>
-              <a:rPr lang="en-GB" noProof="0" dirty="0">
+              <a:t> </a:t>
+            </a:r>
+            <a:r>
+              <a:rPr lang="en-GB" b="1" noProof="0" dirty="0">
                 <a:solidFill>
                   <a:schemeClr val="bg1">
                     <a:lumMod val="75000"/>
                   </a:schemeClr>
                 </a:solidFill>
+                <a:hlinkClick r:id="rId4"/>
               </a:rPr>
-              <a:t> deletes rules matching at least the specified fields;</a:t>
-            </a:r>
-          </a:p>
-          <a:p>
-            <a:pPr lvl="1"/>
-            <a:r>
-              <a:rPr lang="en-GB" noProof="0" dirty="0" err="1">
+              <a:t>[2]</a:t>
+            </a:r>
+            <a:endParaRPr lang="en-GB" b="1" noProof="0" dirty="0">
+              <a:solidFill>
+                <a:schemeClr val="bg1">
+                  <a:lumMod val="75000"/>
+                </a:schemeClr>
+              </a:solidFill>
+            </a:endParaRPr>
+          </a:p>
+          <a:p>
+            <a:r>
+              <a:rPr lang="en-GB" noProof="0" dirty="0">
                 <a:solidFill>
                   <a:schemeClr val="bg1">
                     <a:lumMod val="75000"/>
                   </a:schemeClr>
                 </a:solidFill>
               </a:rPr>
-              <a:t>OFFlowDeleteStrict</a:t>
-            </a:r>
+              <a:t>Learning switch: </a:t>
+            </a:r>
+          </a:p>
+          <a:p>
+            <a:pPr lvl="1"/>
             <a:r>
               <a:rPr lang="en-GB" noProof="0" dirty="0">
                 <a:solidFill>
@@ -13673,24 +13039,165 @@
                   </a:schemeClr>
                 </a:solidFill>
               </a:rPr>
-              <a:t> deletes the rules that exactly looks like the match you specify.</a:t>
-            </a:r>
-          </a:p>
-          <a:p>
-            <a:r>
-              <a:rPr lang="en-GB" noProof="0" dirty="0">
+              <a:t>Added method to </a:t>
+            </a:r>
+            <a:r>
+              <a:rPr lang="en-GB" i="1" noProof="0" dirty="0" err="1">
                 <a:solidFill>
                   <a:schemeClr val="bg1">
                     <a:lumMod val="75000"/>
                   </a:schemeClr>
                 </a:solidFill>
               </a:rPr>
-              <a:t>Testing is done in Python using mininet library</a:t>
+              <a:t>ILearningSwitch</a:t>
+            </a:r>
+            <a:r>
+              <a:rPr lang="en-GB" noProof="0" dirty="0">
+                <a:solidFill>
+                  <a:schemeClr val="bg1">
+                    <a:lumMod val="75000"/>
+                  </a:schemeClr>
+                </a:solidFill>
+              </a:rPr>
+              <a:t> </a:t>
+            </a:r>
+            <a:r>
+              <a:rPr lang="en-GB" dirty="0">
+                <a:solidFill>
+                  <a:schemeClr val="bg1">
+                    <a:lumMod val="75000"/>
+                  </a:schemeClr>
+                </a:solidFill>
+              </a:rPr>
+              <a:t>to retrieve learned </a:t>
+            </a:r>
+            <a:r>
+              <a:rPr lang="en-GB" noProof="0" dirty="0">
+                <a:solidFill>
+                  <a:schemeClr val="bg1">
+                    <a:lumMod val="75000"/>
+                  </a:schemeClr>
+                </a:solidFill>
+              </a:rPr>
+              <a:t>port from MAC address</a:t>
+            </a:r>
+          </a:p>
+          <a:p>
+            <a:r>
+              <a:rPr lang="en-GB" noProof="0" dirty="0">
+                <a:solidFill>
+                  <a:schemeClr val="bg1">
+                    <a:lumMod val="75000"/>
+                  </a:schemeClr>
+                </a:solidFill>
+              </a:rPr>
+              <a:t>Deleting rules types [</a:t>
+            </a:r>
+            <a:r>
+              <a:rPr lang="en-GB" noProof="0" dirty="0">
+                <a:solidFill>
+                  <a:schemeClr val="bg1">
+                    <a:lumMod val="75000"/>
+                  </a:schemeClr>
+                </a:solidFill>
+                <a:hlinkClick r:id="rId5">
+                  <a:extLst>
+                    <a:ext uri="{A12FA001-AC4F-418D-AE19-62706E023703}">
+                      <ahyp:hlinkClr xmlns:ahyp="http://schemas.microsoft.com/office/drawing/2018/hyperlinkcolor" val="tx"/>
+                    </a:ext>
+                  </a:extLst>
+                </a:hlinkClick>
+              </a:rPr>
+              <a:t>3</a:t>
+            </a:r>
+            <a:r>
+              <a:rPr lang="en-GB" noProof="0" dirty="0">
+                <a:solidFill>
+                  <a:schemeClr val="bg1">
+                    <a:lumMod val="75000"/>
+                  </a:schemeClr>
+                </a:solidFill>
+              </a:rPr>
+              <a:t>]</a:t>
             </a:r>
           </a:p>
           <a:p>
             <a:pPr lvl="1"/>
-            <a:endParaRPr lang="en-GB" noProof="0" dirty="0"/>
+            <a:r>
+              <a:rPr lang="en-GB" i="1" noProof="0" dirty="0" err="1">
+                <a:solidFill>
+                  <a:schemeClr val="bg1">
+                    <a:lumMod val="75000"/>
+                  </a:schemeClr>
+                </a:solidFill>
+              </a:rPr>
+              <a:t>OFFlowDelete</a:t>
+            </a:r>
+            <a:r>
+              <a:rPr lang="en-GB" noProof="0" dirty="0">
+                <a:solidFill>
+                  <a:schemeClr val="bg1">
+                    <a:lumMod val="75000"/>
+                  </a:schemeClr>
+                </a:solidFill>
+              </a:rPr>
+              <a:t> deletes rules matching at least the specified fields</a:t>
+            </a:r>
+          </a:p>
+          <a:p>
+            <a:pPr lvl="1"/>
+            <a:r>
+              <a:rPr lang="en-GB" i="1" noProof="0" dirty="0" err="1">
+                <a:solidFill>
+                  <a:schemeClr val="bg1">
+                    <a:lumMod val="75000"/>
+                  </a:schemeClr>
+                </a:solidFill>
+              </a:rPr>
+              <a:t>OFFlowDeleteStrict</a:t>
+            </a:r>
+            <a:r>
+              <a:rPr lang="en-GB" noProof="0" dirty="0">
+                <a:solidFill>
+                  <a:schemeClr val="bg1">
+                    <a:lumMod val="75000"/>
+                  </a:schemeClr>
+                </a:solidFill>
+              </a:rPr>
+              <a:t> deletes the rules that exactly looks like the match you specify</a:t>
+            </a:r>
+          </a:p>
+          <a:p>
+            <a:r>
+              <a:rPr lang="en-GB" noProof="0" dirty="0">
+                <a:solidFill>
+                  <a:schemeClr val="bg1">
+                    <a:lumMod val="75000"/>
+                  </a:schemeClr>
+                </a:solidFill>
+              </a:rPr>
+              <a:t>Testing is done in Python using mininet library and not mininet cli</a:t>
+            </a:r>
+          </a:p>
+          <a:p>
+            <a:pPr lvl="1"/>
+            <a:r>
+              <a:rPr lang="en-GB" dirty="0">
+                <a:solidFill>
+                  <a:schemeClr val="bg1">
+                    <a:lumMod val="75000"/>
+                  </a:schemeClr>
+                </a:solidFill>
+              </a:rPr>
+              <a:t>Due to automating issues for command injection</a:t>
+            </a:r>
+            <a:endParaRPr lang="en-GB" noProof="0" dirty="0">
+              <a:solidFill>
+                <a:schemeClr val="bg1">
+                  <a:lumMod val="75000"/>
+                </a:schemeClr>
+              </a:solidFill>
+            </a:endParaRPr>
           </a:p>
         </p:txBody>
       </p:sp>
@@ -13744,18 +13251,17 @@
           <a:bodyPr/>
           <a:lstStyle/>
           <a:p>
-            <a:fld id="{5BB7E168-F539-4513-AD44-F276B24E7DDF}" type="slidenum">
-              <a:rPr lang="en-GB" smtClean="0"/>
-              <a:t>9</a:t>
-            </a:fld>
-            <a:endParaRPr lang="en-GB"/>
+            <a:r>
+              <a:rPr lang="it-IT" dirty="0"/>
+              <a:t>8</a:t>
+            </a:r>
           </a:p>
         </p:txBody>
       </p:sp>
     </p:spTree>
     <p:extLst>
       <p:ext uri="{BB962C8B-B14F-4D97-AF65-F5344CB8AC3E}">
-        <p14:creationId xmlns:p14="http://schemas.microsoft.com/office/powerpoint/2010/main" val="81249771"/>
+        <p14:creationId xmlns:p14="http://schemas.microsoft.com/office/powerpoint/2010/main" val="4069999851"/>
       </p:ext>
     </p:extLst>
   </p:cSld>

</xml_diff>

<commit_message>
pptx: add comment at the testing part
</commit_message>
<xml_diff>
--- a/Docs/DDoSDefence.pptx
+++ b/Docs/DDoSDefence.pptx
@@ -216,7 +216,7 @@
           <a:p>
             <a:fld id="{77EA6FB2-8CC3-4627-9AFD-974BAE12EB8C}" type="datetimeFigureOut">
               <a:rPr lang="en-GB" smtClean="0"/>
-              <a:t>27/01/2019</a:t>
+              <a:t>29/01/2019</a:t>
             </a:fld>
             <a:endParaRPr lang="en-GB"/>
           </a:p>
@@ -769,6 +769,150 @@
           <a:bodyPr/>
           <a:lstStyle/>
           <a:p>
+            <a:r>
+              <a:rPr lang="en-US" dirty="0"/>
+              <a:t>Il </a:t>
+            </a:r>
+            <a:r>
+              <a:rPr lang="en-US" dirty="0" err="1"/>
+              <a:t>nostro</a:t>
+            </a:r>
+            <a:r>
+              <a:rPr lang="en-US" dirty="0"/>
+              <a:t> modulo è </a:t>
+            </a:r>
+            <a:r>
+              <a:rPr lang="en-US" dirty="0" err="1"/>
+              <a:t>stato</a:t>
+            </a:r>
+            <a:r>
+              <a:rPr lang="en-US" dirty="0"/>
+              <a:t> </a:t>
+            </a:r>
+            <a:r>
+              <a:rPr lang="en-US" dirty="0" err="1"/>
+              <a:t>testato</a:t>
+            </a:r>
+            <a:r>
+              <a:rPr lang="en-US" dirty="0"/>
+              <a:t> </a:t>
+            </a:r>
+            <a:r>
+              <a:rPr lang="en-US" dirty="0" err="1"/>
+              <a:t>usando</a:t>
+            </a:r>
+            <a:r>
+              <a:rPr lang="en-US" dirty="0"/>
+              <a:t> un set di script da </a:t>
+            </a:r>
+            <a:r>
+              <a:rPr lang="en-US" dirty="0" err="1"/>
+              <a:t>noi</a:t>
+            </a:r>
+            <a:r>
+              <a:rPr lang="en-US" dirty="0"/>
+              <a:t> </a:t>
+            </a:r>
+            <a:r>
+              <a:rPr lang="en-US" dirty="0" err="1"/>
+              <a:t>prodotti</a:t>
+            </a:r>
+            <a:r>
+              <a:rPr lang="en-US" dirty="0"/>
+              <a:t>. </a:t>
+            </a:r>
+          </a:p>
+          <a:p>
+            <a:r>
+              <a:rPr lang="en-US" dirty="0" err="1"/>
+              <a:t>Abbiamo</a:t>
+            </a:r>
+            <a:r>
+              <a:rPr lang="en-US" dirty="0"/>
+              <a:t> </a:t>
+            </a:r>
+            <a:r>
+              <a:rPr lang="en-US" dirty="0" err="1"/>
+              <a:t>creato</a:t>
+            </a:r>
+            <a:r>
+              <a:rPr lang="en-US" dirty="0"/>
+              <a:t> un </a:t>
+            </a:r>
+            <a:r>
+              <a:rPr lang="en-US" dirty="0" err="1"/>
+              <a:t>ambiente</a:t>
+            </a:r>
+            <a:r>
+              <a:rPr lang="en-US" dirty="0"/>
+              <a:t> come </a:t>
+            </a:r>
+            <a:r>
+              <a:rPr lang="en-US" dirty="0" err="1"/>
+              <a:t>quello</a:t>
+            </a:r>
+            <a:r>
+              <a:rPr lang="en-US" dirty="0"/>
+              <a:t> in </a:t>
+            </a:r>
+            <a:r>
+              <a:rPr lang="en-US" dirty="0" err="1"/>
+              <a:t>figura</a:t>
+            </a:r>
+            <a:r>
+              <a:rPr lang="en-US" dirty="0"/>
+              <a:t>, </a:t>
+            </a:r>
+            <a:r>
+              <a:rPr lang="en-US" dirty="0" err="1"/>
+              <a:t>composto</a:t>
+            </a:r>
+            <a:r>
+              <a:rPr lang="en-US" dirty="0"/>
+              <a:t> da un server HTTP, 3 client, 8 bot e </a:t>
+            </a:r>
+            <a:r>
+              <a:rPr lang="en-US" dirty="0" err="1"/>
+              <a:t>uno</a:t>
+            </a:r>
+            <a:r>
+              <a:rPr lang="en-US" dirty="0"/>
+              <a:t> switch con controller.</a:t>
+            </a:r>
+          </a:p>
+          <a:p>
+            <a:pPr marL="0" marR="0" lvl="0" indent="0" algn="l" defTabSz="914400" rtl="0" eaLnBrk="1" fontAlgn="auto" latinLnBrk="0" hangingPunct="1">
+              <a:lnSpc>
+                <a:spcPct val="100000"/>
+              </a:lnSpc>
+              <a:spcBef>
+                <a:spcPts val="0"/>
+              </a:spcBef>
+              <a:spcAft>
+                <a:spcPts val="0"/>
+              </a:spcAft>
+              <a:buClrTx/>
+              <a:buSzTx/>
+              <a:buFontTx/>
+              <a:buNone/>
+              <a:tabLst/>
+              <a:defRPr/>
+            </a:pPr>
+            <a:r>
+              <a:rPr lang="it-IT" dirty="0"/>
+              <a:t>Il server ha un indirizzo nel range di 7.7.7.0/24 i client e i bot 80.80.80.0/24 e il controller aspetterà per le connessioni </a:t>
+            </a:r>
+            <a:r>
+              <a:rPr lang="it-IT" dirty="0" err="1"/>
+              <a:t>OpenFlow</a:t>
+            </a:r>
+            <a:r>
+              <a:rPr lang="it-IT" dirty="0"/>
+              <a:t> PACKET_IN su 120.0.0.1:6653. </a:t>
+            </a:r>
+            <a:endParaRPr lang="en-GB" dirty="0"/>
+          </a:p>
+          <a:p>
             <a:endParaRPr lang="en-US" dirty="0"/>
           </a:p>
         </p:txBody>
@@ -853,30 +997,54 @@
           <a:bodyPr/>
           <a:lstStyle/>
           <a:p>
-            <a:pPr marL="0" marR="0" lvl="0" indent="0" algn="l" defTabSz="914400" rtl="0" eaLnBrk="1" fontAlgn="auto" latinLnBrk="0" hangingPunct="1">
-              <a:lnSpc>
-                <a:spcPct val="100000"/>
-              </a:lnSpc>
-              <a:spcBef>
-                <a:spcPts val="0"/>
-              </a:spcBef>
-              <a:spcAft>
-                <a:spcPts val="0"/>
-              </a:spcAft>
-              <a:buClrTx/>
-              <a:buSzTx/>
-              <a:buFontTx/>
-              <a:buNone/>
-              <a:tabLst/>
-              <a:defRPr/>
-            </a:pPr>
-            <a:r>
-              <a:rPr lang="en-GB" dirty="0"/>
-              <a:t>Even if the Bots send requests continuously, the Server is always able to respond, because it opens a new thread for each request, so the server does not stop even if it is bombarded with requests</a:t>
-            </a:r>
-            <a:endParaRPr lang="it-IT" dirty="0"/>
-          </a:p>
-          <a:p>
+            <a:r>
+              <a:rPr lang="it-IT" dirty="0"/>
+              <a:t>I due scenari sono simulati usando due script separati: </a:t>
+            </a:r>
+            <a:r>
+              <a:rPr lang="it-IT" dirty="0" err="1"/>
+              <a:t>start_client</a:t>
+            </a:r>
+            <a:r>
+              <a:rPr lang="it-IT" dirty="0"/>
+              <a:t> e </a:t>
+            </a:r>
+            <a:r>
+              <a:rPr lang="it-IT" dirty="0" err="1"/>
+              <a:t>start_bot</a:t>
+            </a:r>
+            <a:r>
+              <a:rPr lang="it-IT" dirty="0"/>
+              <a:t>. </a:t>
+            </a:r>
+          </a:p>
+          <a:p>
+            <a:r>
+              <a:rPr lang="it-IT" dirty="0" err="1"/>
+              <a:t>Start_bot</a:t>
+            </a:r>
+            <a:r>
+              <a:rPr lang="it-IT" dirty="0"/>
+              <a:t> inizia una connessione per volta e prova a riconnettersi se la perde, un altro bot ancora potrebbe </a:t>
+            </a:r>
+            <a:r>
+              <a:rPr lang="it-IT" dirty="0" err="1"/>
+              <a:t>inizare</a:t>
+            </a:r>
+            <a:r>
+              <a:rPr lang="it-IT" dirty="0"/>
+              <a:t> una connessione in modo asincrono, questo andrebbe ad incrementare il contatore del numero di connessioni del server.</a:t>
+            </a:r>
+          </a:p>
+          <a:p>
+            <a:r>
+              <a:rPr lang="it-IT" dirty="0" err="1"/>
+              <a:t>Start_client</a:t>
+            </a:r>
+            <a:r>
+              <a:rPr lang="it-IT" dirty="0"/>
+              <a:t> deve essere in grado di fare il forwarding, ma questo deve essere abbastanza complesso da non poter essere fatto da un bot, abbiamo risolto questo problema facendo in modo che lo script del bot ignori il forwarding.</a:t>
+            </a:r>
             <a:endParaRPr lang="en-GB" dirty="0"/>
           </a:p>
         </p:txBody>
@@ -961,28 +1129,32 @@
           <a:bodyPr/>
           <a:lstStyle/>
           <a:p>
-            <a:pPr marL="0" marR="0" lvl="0" indent="0" algn="l" defTabSz="914400" rtl="0" eaLnBrk="1" fontAlgn="auto" latinLnBrk="0" hangingPunct="1">
-              <a:lnSpc>
-                <a:spcPct val="100000"/>
-              </a:lnSpc>
-              <a:spcBef>
-                <a:spcPts val="0"/>
-              </a:spcBef>
-              <a:spcAft>
-                <a:spcPts val="0"/>
-              </a:spcAft>
-              <a:buClrTx/>
-              <a:buSzTx/>
-              <a:buFontTx/>
-              <a:buNone/>
-              <a:tabLst/>
-              <a:defRPr/>
-            </a:pPr>
-            <a:r>
-              <a:rPr lang="en-GB" dirty="0"/>
-              <a:t>Even if the Bots send requests continuously, the Server is always able to respond, because it opens a new thread for each request, so the server does not stop even if it is bombarded with requests</a:t>
-            </a:r>
-            <a:endParaRPr lang="it-IT" dirty="0"/>
+            <a:r>
+              <a:rPr lang="it-IT" dirty="0"/>
+              <a:t>I client connessi al server possono essere client regolari o maliziosi. Sia i client che i bot mandano continuamente richieste HTTP al server,  la differenza è che il client potrà risolvere il forwarding mentre il bot non può eseguire operazioni complesse come il </a:t>
+            </a:r>
+            <a:r>
+              <a:rPr lang="it-IT" dirty="0" err="1"/>
+              <a:t>captcha</a:t>
+            </a:r>
+            <a:r>
+              <a:rPr lang="it-IT" dirty="0"/>
+              <a:t> per il forwarding e quindi continuerà a fare richieste sul vecchio indirizzo.</a:t>
+            </a:r>
+          </a:p>
+          <a:p>
+            <a:r>
+              <a:rPr lang="it-IT" dirty="0"/>
+              <a:t>Non sono necessarie regole di routing o di inoltro complesse perché lo switch risolverà il problema di indirizzamento utilizzando le tabelle di switching del </a:t>
+            </a:r>
+            <a:r>
+              <a:rPr lang="it-IT" dirty="0" err="1"/>
+              <a:t>layer</a:t>
+            </a:r>
+            <a:r>
+              <a:rPr lang="it-IT" dirty="0"/>
+              <a:t> 2. L’unica regola che serve è quella per mandare i pacchetti originati dai device emulati attraverso l’interfaccia connessa allo switch. ARP assicura di impostare l’indirizzo MAC di destinazione  corretto sul pacchetto di origine.</a:t>
+            </a:r>
           </a:p>
           <a:p>
             <a:endParaRPr lang="en-GB" dirty="0"/>
@@ -1069,30 +1241,26 @@
           <a:bodyPr/>
           <a:lstStyle/>
           <a:p>
-            <a:pPr marL="0" marR="0" lvl="0" indent="0" algn="l" defTabSz="914400" rtl="0" eaLnBrk="1" fontAlgn="auto" latinLnBrk="0" hangingPunct="1">
-              <a:lnSpc>
-                <a:spcPct val="100000"/>
-              </a:lnSpc>
-              <a:spcBef>
-                <a:spcPts val="0"/>
-              </a:spcBef>
-              <a:spcAft>
-                <a:spcPts val="0"/>
-              </a:spcAft>
-              <a:buClrTx/>
-              <a:buSzTx/>
-              <a:buFontTx/>
-              <a:buNone/>
-              <a:tabLst/>
-              <a:defRPr/>
-            </a:pPr>
-            <a:r>
-              <a:rPr lang="en-GB" dirty="0"/>
-              <a:t>Even if the Bots send requests continuously, the Server is always able to respond, because it opens a new thread for each request, so the server does not stop even if it is bombarded with requests</a:t>
-            </a:r>
-            <a:endParaRPr lang="it-IT" dirty="0"/>
-          </a:p>
-          <a:p>
+            <a:r>
+              <a:rPr lang="it-IT" dirty="0"/>
+              <a:t>Quando la protezione è disabilitata ogni pacchetto viene </a:t>
+            </a:r>
+            <a:r>
+              <a:rPr lang="it-IT" dirty="0" err="1"/>
+              <a:t>forwardato</a:t>
+            </a:r>
+            <a:r>
+              <a:rPr lang="it-IT" dirty="0"/>
+              <a:t> al server e ogni risposta del server viene mandata al client. Quando il server si accorge di essere sotto attacco notifica al controller di abilitare la protezione attraverso l’interfaccia REST e il server cambia il suo indirizzo con uno nuovo fornito dal controller, mantenendo il vecchio indirizzo in cui verrà eseguito il </a:t>
+            </a:r>
+            <a:r>
+              <a:rPr lang="it-IT" dirty="0" err="1"/>
+              <a:t>captcha</a:t>
+            </a:r>
+            <a:r>
+              <a:rPr lang="it-IT" dirty="0"/>
+              <a:t> per il forwarding al nuovo indirizzo. Quando la protezione è abilitata, avremo lo stesso tipo di risposta sia per i client che per i server solamente fino a quando il numero di connessioni è minore della soglia prestabilita. Superata la soglia il client viene identificato come bot e le vecchie entrate della tabella vengono eliminate tramite una regola di timeout. Se è il client ad effettuare le richieste con la protezione attiva, allora passerà al nuovo indirizzo D’ e le vecchie regole sono droppate.</a:t>
+            </a:r>
             <a:endParaRPr lang="en-GB" dirty="0"/>
           </a:p>
         </p:txBody>
@@ -1177,30 +1345,34 @@
           <a:bodyPr/>
           <a:lstStyle/>
           <a:p>
-            <a:pPr marL="0" marR="0" lvl="0" indent="0" algn="l" defTabSz="914400" rtl="0" eaLnBrk="1" fontAlgn="auto" latinLnBrk="0" hangingPunct="1">
-              <a:lnSpc>
-                <a:spcPct val="100000"/>
-              </a:lnSpc>
-              <a:spcBef>
-                <a:spcPts val="0"/>
-              </a:spcBef>
-              <a:spcAft>
-                <a:spcPts val="0"/>
-              </a:spcAft>
-              <a:buClrTx/>
-              <a:buSzTx/>
-              <a:buFontTx/>
-              <a:buNone/>
-              <a:tabLst/>
-              <a:defRPr/>
-            </a:pPr>
-            <a:r>
-              <a:rPr lang="en-GB" dirty="0"/>
-              <a:t>Even if the Bots send requests continuously, the Server is always able to respond, because it opens a new thread for each request, so the server does not stop even if it is bombarded with requests</a:t>
-            </a:r>
-            <a:endParaRPr lang="it-IT" dirty="0"/>
-          </a:p>
-          <a:p>
+            <a:r>
+              <a:rPr lang="it-IT" dirty="0"/>
+              <a:t>Quindi, ricapitolando, l’ambiente di test è creato utilizzando le librerie </a:t>
+            </a:r>
+            <a:r>
+              <a:rPr lang="it-IT" dirty="0" err="1"/>
+              <a:t>mininet</a:t>
+            </a:r>
+            <a:r>
+              <a:rPr lang="it-IT" dirty="0"/>
+              <a:t> di </a:t>
+            </a:r>
+            <a:r>
+              <a:rPr lang="it-IT" dirty="0" err="1"/>
+              <a:t>python</a:t>
+            </a:r>
+            <a:r>
+              <a:rPr lang="it-IT" dirty="0"/>
+              <a:t>. Lo script fornisce una graphic user interface che può eseguire la procedura di abilitazione della protezione tramite l’utilizzo di comandi da console oppure tramite la libreria request per l’esecuzione delle richieste REST api per l’inizializzazione e l’abilitazione della protezione. L’interfaccia grafica mostra una consolle per ogni client e bot nella quale ognuno di loro riporta la risposta alla richiesta HTTP. Nell’interfaccia grafica che adesso andremo a vedere viene fornito un set di pulsanti per avviare il test, abilitare la protezione ed eseguire dei test generici come il </a:t>
+            </a:r>
+            <a:r>
+              <a:rPr lang="it-IT" dirty="0" err="1"/>
+              <a:t>ping</a:t>
+            </a:r>
+            <a:r>
+              <a:rPr lang="it-IT" dirty="0"/>
+              <a:t>. </a:t>
+            </a:r>
             <a:endParaRPr lang="en-GB" dirty="0"/>
           </a:p>
         </p:txBody>
@@ -2354,7 +2526,7 @@
           <a:p>
             <a:fld id="{144F7E4B-DE20-473D-AB1D-E55B028D2B82}" type="datetime1">
               <a:rPr lang="en-GB" smtClean="0"/>
-              <a:t>27/01/2019</a:t>
+              <a:t>29/01/2019</a:t>
             </a:fld>
             <a:endParaRPr lang="en-GB"/>
           </a:p>
@@ -2558,7 +2730,7 @@
           <a:p>
             <a:fld id="{5EF5E582-83CD-4B5D-93A5-3EE70CBA785D}" type="datetime1">
               <a:rPr lang="en-GB" smtClean="0"/>
-              <a:t>27/01/2019</a:t>
+              <a:t>29/01/2019</a:t>
             </a:fld>
             <a:endParaRPr lang="en-GB"/>
           </a:p>
@@ -2772,7 +2944,7 @@
           <a:p>
             <a:fld id="{9BDD35A3-C59F-4EE5-AD24-E668C12CE372}" type="datetime1">
               <a:rPr lang="en-GB" smtClean="0"/>
-              <a:t>27/01/2019</a:t>
+              <a:t>29/01/2019</a:t>
             </a:fld>
             <a:endParaRPr lang="en-GB"/>
           </a:p>
@@ -2976,7 +3148,7 @@
           <a:p>
             <a:fld id="{A6F8E820-4D09-4884-A162-6CE29A96B170}" type="datetime1">
               <a:rPr lang="en-GB" smtClean="0"/>
-              <a:t>27/01/2019</a:t>
+              <a:t>29/01/2019</a:t>
             </a:fld>
             <a:endParaRPr lang="en-GB"/>
           </a:p>
@@ -3256,7 +3428,7 @@
           <a:p>
             <a:fld id="{5D05A4AA-0914-4B1F-88E3-9415A6274E09}" type="datetime1">
               <a:rPr lang="en-GB" smtClean="0"/>
-              <a:t>27/01/2019</a:t>
+              <a:t>29/01/2019</a:t>
             </a:fld>
             <a:endParaRPr lang="en-GB"/>
           </a:p>
@@ -3528,7 +3700,7 @@
           <a:p>
             <a:fld id="{6A2CF0AD-B45F-40C1-B1FF-A739A7554DF9}" type="datetime1">
               <a:rPr lang="en-GB" smtClean="0"/>
-              <a:t>27/01/2019</a:t>
+              <a:t>29/01/2019</a:t>
             </a:fld>
             <a:endParaRPr lang="en-GB"/>
           </a:p>
@@ -3947,7 +4119,7 @@
           <a:p>
             <a:fld id="{3E087565-DE12-408E-9747-F41F38EDB236}" type="datetime1">
               <a:rPr lang="en-GB" smtClean="0"/>
-              <a:t>27/01/2019</a:t>
+              <a:t>29/01/2019</a:t>
             </a:fld>
             <a:endParaRPr lang="en-GB"/>
           </a:p>
@@ -4093,7 +4265,7 @@
           <a:p>
             <a:fld id="{CBC1C182-3B38-4198-AA69-8B60B91A400A}" type="datetime1">
               <a:rPr lang="en-GB" smtClean="0"/>
-              <a:t>27/01/2019</a:t>
+              <a:t>29/01/2019</a:t>
             </a:fld>
             <a:endParaRPr lang="en-GB"/>
           </a:p>
@@ -4210,7 +4382,7 @@
           <a:p>
             <a:fld id="{5BF3AFCF-F646-465F-92EC-2785C2E056CD}" type="datetime1">
               <a:rPr lang="en-GB" smtClean="0"/>
-              <a:t>27/01/2019</a:t>
+              <a:t>29/01/2019</a:t>
             </a:fld>
             <a:endParaRPr lang="en-GB"/>
           </a:p>
@@ -4527,7 +4699,7 @@
           <a:p>
             <a:fld id="{9A8F7003-99C8-481C-A4CD-B3BB91C2A8F7}" type="datetime1">
               <a:rPr lang="en-GB" smtClean="0"/>
-              <a:t>27/01/2019</a:t>
+              <a:t>29/01/2019</a:t>
             </a:fld>
             <a:endParaRPr lang="en-GB"/>
           </a:p>
@@ -4820,7 +4992,7 @@
           <a:p>
             <a:fld id="{E0584EEC-4656-48D7-8A48-D261D57F7554}" type="datetime1">
               <a:rPr lang="en-GB" smtClean="0"/>
-              <a:t>27/01/2019</a:t>
+              <a:t>29/01/2019</a:t>
             </a:fld>
             <a:endParaRPr lang="en-GB"/>
           </a:p>
@@ -5067,7 +5239,7 @@
           <a:p>
             <a:fld id="{08A3035C-570A-4995-B50D-9FFDAF4A1C50}" type="datetime1">
               <a:rPr lang="en-GB" smtClean="0"/>
-              <a:t>27/01/2019</a:t>
+              <a:t>29/01/2019</a:t>
             </a:fld>
             <a:endParaRPr lang="en-GB"/>
           </a:p>

</xml_diff>

<commit_message>
Add DDoS protection Architecture image in the project presentation
</commit_message>
<xml_diff>
--- a/Docs/DDoSDefence.pptx
+++ b/Docs/DDoSDefence.pptx
@@ -216,7 +216,7 @@
           <a:p>
             <a:fld id="{77EA6FB2-8CC3-4627-9AFD-974BAE12EB8C}" type="datetimeFigureOut">
               <a:rPr lang="en-GB" smtClean="0"/>
-              <a:t>29/01/2019</a:t>
+              <a:t>30/01/2019</a:t>
             </a:fld>
             <a:endParaRPr lang="en-GB"/>
           </a:p>
@@ -2526,7 +2526,7 @@
           <a:p>
             <a:fld id="{144F7E4B-DE20-473D-AB1D-E55B028D2B82}" type="datetime1">
               <a:rPr lang="en-GB" smtClean="0"/>
-              <a:t>29/01/2019</a:t>
+              <a:t>30/01/2019</a:t>
             </a:fld>
             <a:endParaRPr lang="en-GB"/>
           </a:p>
@@ -2730,7 +2730,7 @@
           <a:p>
             <a:fld id="{5EF5E582-83CD-4B5D-93A5-3EE70CBA785D}" type="datetime1">
               <a:rPr lang="en-GB" smtClean="0"/>
-              <a:t>29/01/2019</a:t>
+              <a:t>30/01/2019</a:t>
             </a:fld>
             <a:endParaRPr lang="en-GB"/>
           </a:p>
@@ -2944,7 +2944,7 @@
           <a:p>
             <a:fld id="{9BDD35A3-C59F-4EE5-AD24-E668C12CE372}" type="datetime1">
               <a:rPr lang="en-GB" smtClean="0"/>
-              <a:t>29/01/2019</a:t>
+              <a:t>30/01/2019</a:t>
             </a:fld>
             <a:endParaRPr lang="en-GB"/>
           </a:p>
@@ -3148,7 +3148,7 @@
           <a:p>
             <a:fld id="{A6F8E820-4D09-4884-A162-6CE29A96B170}" type="datetime1">
               <a:rPr lang="en-GB" smtClean="0"/>
-              <a:t>29/01/2019</a:t>
+              <a:t>30/01/2019</a:t>
             </a:fld>
             <a:endParaRPr lang="en-GB"/>
           </a:p>
@@ -3428,7 +3428,7 @@
           <a:p>
             <a:fld id="{5D05A4AA-0914-4B1F-88E3-9415A6274E09}" type="datetime1">
               <a:rPr lang="en-GB" smtClean="0"/>
-              <a:t>29/01/2019</a:t>
+              <a:t>30/01/2019</a:t>
             </a:fld>
             <a:endParaRPr lang="en-GB"/>
           </a:p>
@@ -3700,7 +3700,7 @@
           <a:p>
             <a:fld id="{6A2CF0AD-B45F-40C1-B1FF-A739A7554DF9}" type="datetime1">
               <a:rPr lang="en-GB" smtClean="0"/>
-              <a:t>29/01/2019</a:t>
+              <a:t>30/01/2019</a:t>
             </a:fld>
             <a:endParaRPr lang="en-GB"/>
           </a:p>
@@ -4119,7 +4119,7 @@
           <a:p>
             <a:fld id="{3E087565-DE12-408E-9747-F41F38EDB236}" type="datetime1">
               <a:rPr lang="en-GB" smtClean="0"/>
-              <a:t>29/01/2019</a:t>
+              <a:t>30/01/2019</a:t>
             </a:fld>
             <a:endParaRPr lang="en-GB"/>
           </a:p>
@@ -4265,7 +4265,7 @@
           <a:p>
             <a:fld id="{CBC1C182-3B38-4198-AA69-8B60B91A400A}" type="datetime1">
               <a:rPr lang="en-GB" smtClean="0"/>
-              <a:t>29/01/2019</a:t>
+              <a:t>30/01/2019</a:t>
             </a:fld>
             <a:endParaRPr lang="en-GB"/>
           </a:p>
@@ -4382,7 +4382,7 @@
           <a:p>
             <a:fld id="{5BF3AFCF-F646-465F-92EC-2785C2E056CD}" type="datetime1">
               <a:rPr lang="en-GB" smtClean="0"/>
-              <a:t>29/01/2019</a:t>
+              <a:t>30/01/2019</a:t>
             </a:fld>
             <a:endParaRPr lang="en-GB"/>
           </a:p>
@@ -4699,7 +4699,7 @@
           <a:p>
             <a:fld id="{9A8F7003-99C8-481C-A4CD-B3BB91C2A8F7}" type="datetime1">
               <a:rPr lang="en-GB" smtClean="0"/>
-              <a:t>29/01/2019</a:t>
+              <a:t>30/01/2019</a:t>
             </a:fld>
             <a:endParaRPr lang="en-GB"/>
           </a:p>
@@ -4992,7 +4992,7 @@
           <a:p>
             <a:fld id="{E0584EEC-4656-48D7-8A48-D261D57F7554}" type="datetime1">
               <a:rPr lang="en-GB" smtClean="0"/>
-              <a:t>29/01/2019</a:t>
+              <a:t>30/01/2019</a:t>
             </a:fld>
             <a:endParaRPr lang="en-GB"/>
           </a:p>
@@ -5239,7 +5239,7 @@
           <a:p>
             <a:fld id="{08A3035C-570A-4995-B50D-9FFDAF4A1C50}" type="datetime1">
               <a:rPr lang="en-GB" smtClean="0"/>
-              <a:t>29/01/2019</a:t>
+              <a:t>30/01/2019</a:t>
             </a:fld>
             <a:endParaRPr lang="en-GB"/>
           </a:p>
@@ -10895,41 +10895,6 @@
           <a:chExt cx="0" cy="0"/>
         </a:xfrm>
       </p:grpSpPr>
-      <p:pic>
-        <p:nvPicPr>
-          <p:cNvPr id="7" name="Immagine 6">
-            <a:extLst>
-              <a:ext uri="{FF2B5EF4-FFF2-40B4-BE49-F238E27FC236}">
-                <a16:creationId xmlns:a16="http://schemas.microsoft.com/office/drawing/2014/main" id="{E3A062A0-6FB7-44C9-903C-6987F5F231B1}"/>
-              </a:ext>
-            </a:extLst>
-          </p:cNvPr>
-          <p:cNvPicPr>
-            <a:picLocks noChangeAspect="1"/>
-          </p:cNvPicPr>
-          <p:nvPr/>
-        </p:nvPicPr>
-        <p:blipFill rotWithShape="1">
-          <a:blip r:embed="rId3">
-            <a:extLst>
-              <a:ext uri="{28A0092B-C50C-407E-A947-70E740481C1C}">
-                <a14:useLocalDpi xmlns:a14="http://schemas.microsoft.com/office/drawing/2010/main" val="0"/>
-              </a:ext>
-            </a:extLst>
-          </a:blip>
-          <a:srcRect l="1236" t="-2140" r="-432" b="-1565"/>
-          <a:stretch/>
-        </p:blipFill>
-        <p:spPr>
-          <a:xfrm>
-            <a:off x="3055660" y="-93218"/>
-            <a:ext cx="8954370" cy="7044435"/>
-          </a:xfrm>
-          <a:prstGeom prst="rect">
-            <a:avLst/>
-          </a:prstGeom>
-        </p:spPr>
-      </p:pic>
       <p:sp>
         <p:nvSpPr>
           <p:cNvPr id="19" name="Freeform: Shape 18">
@@ -11523,6 +11488,42 @@
           </a:p>
         </p:txBody>
       </p:sp>
+      <p:pic>
+        <p:nvPicPr>
+          <p:cNvPr id="8" name="Immagine 7">
+            <a:extLst>
+              <a:ext uri="{FF2B5EF4-FFF2-40B4-BE49-F238E27FC236}">
+                <a16:creationId xmlns:a16="http://schemas.microsoft.com/office/drawing/2014/main" id="{AEBF0350-10CE-4D0A-BA4D-8C3237650E6B}"/>
+              </a:ext>
+            </a:extLst>
+          </p:cNvPr>
+          <p:cNvPicPr>
+            <a:picLocks noChangeAspect="1"/>
+          </p:cNvPicPr>
+          <p:nvPr/>
+        </p:nvPicPr>
+        <p:blipFill>
+          <a:blip r:embed="rId3">
+            <a:extLst>
+              <a:ext uri="{28A0092B-C50C-407E-A947-70E740481C1C}">
+                <a14:useLocalDpi xmlns:a14="http://schemas.microsoft.com/office/drawing/2010/main" val="0"/>
+              </a:ext>
+            </a:extLst>
+          </a:blip>
+          <a:stretch>
+            <a:fillRect/>
+          </a:stretch>
+        </p:blipFill>
+        <p:spPr>
+          <a:xfrm>
+            <a:off x="5356746" y="1516940"/>
+            <a:ext cx="6315853" cy="3824119"/>
+          </a:xfrm>
+          <a:prstGeom prst="rect">
+            <a:avLst/>
+          </a:prstGeom>
+        </p:spPr>
+      </p:pic>
     </p:spTree>
     <p:extLst>
       <p:ext uri="{BB962C8B-B14F-4D97-AF65-F5344CB8AC3E}">

</xml_diff>